<commit_message>
MessagesWindow is mostly working.  Needs ability to auto-refresh, render from bottom up and scroll-up refresh.
</commit_message>
<xml_diff>
--- a/Documents/AngbandOS.Web Topology.pptx
+++ b/Documents/AngbandOS.Web Topology.pptx
@@ -113,23 +113,47 @@
 </p:presentation>
 </file>
 
+<file path=ppt/revisionInfo.xml><?xml version="1.0" encoding="utf-8"?>
+<p1510:revInfo xmlns:a="http://schemas.openxmlformats.org/drawingml/2006/main" xmlns:r="http://schemas.openxmlformats.org/officeDocument/2006/relationships" xmlns:p1510="http://schemas.microsoft.com/office/powerpoint/2015/10/main">
+  <p1510:revLst>
+    <p1510:client id="{F93D44ED-375D-4FA9-90AA-824A0B780C8F}" v="2" dt="2023-07-18T01:02:54.655"/>
+  </p1510:revLst>
+</p1510:revInfo>
+</file>
+
 <file path=ppt/changesInfos/changesInfo1.xml><?xml version="1.0" encoding="utf-8"?>
 <pc:chgInfo xmlns:a="http://schemas.openxmlformats.org/drawingml/2006/main" xmlns:r="http://schemas.openxmlformats.org/officeDocument/2006/relationships" xmlns:ac="http://schemas.microsoft.com/office/drawing/2013/main/command" xmlns:pc="http://schemas.microsoft.com/office/powerpoint/2013/main/command">
   <pc:docChgLst>
     <pc:chgData name="Marc Johnston" userId="4bd435294172a9e0" providerId="LiveId" clId="{F93D44ED-375D-4FA9-90AA-824A0B780C8F}"/>
     <pc:docChg chg="undo custSel modSld">
-      <pc:chgData name="Marc Johnston" userId="4bd435294172a9e0" providerId="LiveId" clId="{F93D44ED-375D-4FA9-90AA-824A0B780C8F}" dt="2023-07-17T15:44:11.904" v="943" actId="20577"/>
+      <pc:chgData name="Marc Johnston" userId="4bd435294172a9e0" providerId="LiveId" clId="{F93D44ED-375D-4FA9-90AA-824A0B780C8F}" dt="2023-07-18T01:09:03.779" v="957" actId="14100"/>
       <pc:docMkLst>
         <pc:docMk/>
       </pc:docMkLst>
-      <pc:sldChg chg="modSp mod">
-        <pc:chgData name="Marc Johnston" userId="4bd435294172a9e0" providerId="LiveId" clId="{F93D44ED-375D-4FA9-90AA-824A0B780C8F}" dt="2023-07-17T15:44:11.904" v="943" actId="20577"/>
+      <pc:sldChg chg="addSp delSp modSp mod">
+        <pc:chgData name="Marc Johnston" userId="4bd435294172a9e0" providerId="LiveId" clId="{F93D44ED-375D-4FA9-90AA-824A0B780C8F}" dt="2023-07-18T01:09:03.779" v="957" actId="14100"/>
         <pc:sldMkLst>
           <pc:docMk/>
           <pc:sldMk cId="2233212922" sldId="257"/>
         </pc:sldMkLst>
+        <pc:spChg chg="add mod">
+          <ac:chgData name="Marc Johnston" userId="4bd435294172a9e0" providerId="LiveId" clId="{F93D44ED-375D-4FA9-90AA-824A0B780C8F}" dt="2023-07-18T01:08:57.567" v="955" actId="1076"/>
+          <ac:spMkLst>
+            <pc:docMk/>
+            <pc:sldMk cId="2233212922" sldId="257"/>
+            <ac:spMk id="3" creationId="{472FE763-C632-39E0-CC24-E3FEAEABA863}"/>
+          </ac:spMkLst>
+        </pc:spChg>
         <pc:spChg chg="mod">
-          <ac:chgData name="Marc Johnston" userId="4bd435294172a9e0" providerId="LiveId" clId="{F93D44ED-375D-4FA9-90AA-824A0B780C8F}" dt="2023-07-17T15:24:29.209" v="69" actId="20577"/>
+          <ac:chgData name="Marc Johnston" userId="4bd435294172a9e0" providerId="LiveId" clId="{F93D44ED-375D-4FA9-90AA-824A0B780C8F}" dt="2023-07-18T01:03:16.645" v="952" actId="1076"/>
+          <ac:spMkLst>
+            <pc:docMk/>
+            <pc:sldMk cId="2233212922" sldId="257"/>
+            <ac:spMk id="4" creationId="{361EE555-D2E2-6CE1-0E88-E13C3D96B1C8}"/>
+          </ac:spMkLst>
+        </pc:spChg>
+        <pc:spChg chg="mod">
+          <ac:chgData name="Marc Johnston" userId="4bd435294172a9e0" providerId="LiveId" clId="{F93D44ED-375D-4FA9-90AA-824A0B780C8F}" dt="2023-07-18T01:03:16.645" v="952" actId="1076"/>
           <ac:spMkLst>
             <pc:docMk/>
             <pc:sldMk cId="2233212922" sldId="257"/>
@@ -137,15 +161,15 @@
           </ac:spMkLst>
         </pc:spChg>
         <pc:spChg chg="mod">
-          <ac:chgData name="Marc Johnston" userId="4bd435294172a9e0" providerId="LiveId" clId="{F93D44ED-375D-4FA9-90AA-824A0B780C8F}" dt="2023-07-17T15:44:11.904" v="943" actId="20577"/>
+          <ac:chgData name="Marc Johnston" userId="4bd435294172a9e0" providerId="LiveId" clId="{F93D44ED-375D-4FA9-90AA-824A0B780C8F}" dt="2023-07-18T01:03:16.645" v="952" actId="1076"/>
           <ac:spMkLst>
             <pc:docMk/>
             <pc:sldMk cId="2233212922" sldId="257"/>
             <ac:spMk id="7" creationId="{0A5CE1D2-34E5-AE08-0A55-29C482C7857A}"/>
           </ac:spMkLst>
         </pc:spChg>
-        <pc:spChg chg="mod">
-          <ac:chgData name="Marc Johnston" userId="4bd435294172a9e0" providerId="LiveId" clId="{F93D44ED-375D-4FA9-90AA-824A0B780C8F}" dt="2023-07-17T15:37:05.627" v="793" actId="20577"/>
+        <pc:spChg chg="del mod">
+          <ac:chgData name="Marc Johnston" userId="4bd435294172a9e0" providerId="LiveId" clId="{F93D44ED-375D-4FA9-90AA-824A0B780C8F}" dt="2023-07-18T01:08:50.538" v="954" actId="478"/>
           <ac:spMkLst>
             <pc:docMk/>
             <pc:sldMk cId="2233212922" sldId="257"/>
@@ -153,7 +177,7 @@
           </ac:spMkLst>
         </pc:spChg>
         <pc:spChg chg="mod">
-          <ac:chgData name="Marc Johnston" userId="4bd435294172a9e0" providerId="LiveId" clId="{F93D44ED-375D-4FA9-90AA-824A0B780C8F}" dt="2023-07-17T15:34:52.138" v="615" actId="20577"/>
+          <ac:chgData name="Marc Johnston" userId="4bd435294172a9e0" providerId="LiveId" clId="{F93D44ED-375D-4FA9-90AA-824A0B780C8F}" dt="2023-07-18T01:02:40.635" v="946" actId="1076"/>
           <ac:spMkLst>
             <pc:docMk/>
             <pc:sldMk cId="2233212922" sldId="257"/>
@@ -161,23 +185,127 @@
           </ac:spMkLst>
         </pc:spChg>
         <pc:spChg chg="mod">
-          <ac:chgData name="Marc Johnston" userId="4bd435294172a9e0" providerId="LiveId" clId="{F93D44ED-375D-4FA9-90AA-824A0B780C8F}" dt="2023-07-17T15:30:17.600" v="288" actId="14100"/>
+          <ac:chgData name="Marc Johnston" userId="4bd435294172a9e0" providerId="LiveId" clId="{F93D44ED-375D-4FA9-90AA-824A0B780C8F}" dt="2023-07-18T01:02:40.635" v="946" actId="1076"/>
           <ac:spMkLst>
             <pc:docMk/>
             <pc:sldMk cId="2233212922" sldId="257"/>
             <ac:spMk id="10" creationId="{4C12BEFF-E90E-1D70-62F7-4BEDF3D77363}"/>
           </ac:spMkLst>
         </pc:spChg>
+        <pc:spChg chg="mod">
+          <ac:chgData name="Marc Johnston" userId="4bd435294172a9e0" providerId="LiveId" clId="{F93D44ED-375D-4FA9-90AA-824A0B780C8F}" dt="2023-07-18T01:02:40.635" v="946" actId="1076"/>
+          <ac:spMkLst>
+            <pc:docMk/>
+            <pc:sldMk cId="2233212922" sldId="257"/>
+            <ac:spMk id="11" creationId="{B1FBD51A-3396-DA46-4DB6-1B2110DB7C65}"/>
+          </ac:spMkLst>
+        </pc:spChg>
+        <pc:spChg chg="add mod">
+          <ac:chgData name="Marc Johnston" userId="4bd435294172a9e0" providerId="LiveId" clId="{F93D44ED-375D-4FA9-90AA-824A0B780C8F}" dt="2023-07-18T01:02:28.032" v="945" actId="1076"/>
+          <ac:spMkLst>
+            <pc:docMk/>
+            <pc:sldMk cId="2233212922" sldId="257"/>
+            <ac:spMk id="12" creationId="{7EBD8B86-B21B-910D-94A8-8A462016F5A2}"/>
+          </ac:spMkLst>
+        </pc:spChg>
+        <pc:spChg chg="add mod">
+          <ac:chgData name="Marc Johnston" userId="4bd435294172a9e0" providerId="LiveId" clId="{F93D44ED-375D-4FA9-90AA-824A0B780C8F}" dt="2023-07-18T01:02:28.032" v="945" actId="1076"/>
+          <ac:spMkLst>
+            <pc:docMk/>
+            <pc:sldMk cId="2233212922" sldId="257"/>
+            <ac:spMk id="14" creationId="{AE3440A7-CE35-E404-B1AA-B675A983A11F}"/>
+          </ac:spMkLst>
+        </pc:spChg>
+        <pc:spChg chg="add mod">
+          <ac:chgData name="Marc Johnston" userId="4bd435294172a9e0" providerId="LiveId" clId="{F93D44ED-375D-4FA9-90AA-824A0B780C8F}" dt="2023-07-18T01:02:28.032" v="945" actId="1076"/>
+          <ac:spMkLst>
+            <pc:docMk/>
+            <pc:sldMk cId="2233212922" sldId="257"/>
+            <ac:spMk id="15" creationId="{23F010BA-0A3E-2D9D-C5D0-198753767110}"/>
+          </ac:spMkLst>
+        </pc:spChg>
+        <pc:spChg chg="add mod">
+          <ac:chgData name="Marc Johnston" userId="4bd435294172a9e0" providerId="LiveId" clId="{F93D44ED-375D-4FA9-90AA-824A0B780C8F}" dt="2023-07-18T01:03:00.581" v="949" actId="1076"/>
+          <ac:spMkLst>
+            <pc:docMk/>
+            <pc:sldMk cId="2233212922" sldId="257"/>
+            <ac:spMk id="28" creationId="{C41F0AA0-E02D-0BBD-4248-554AB051E6C8}"/>
+          </ac:spMkLst>
+        </pc:spChg>
+        <pc:spChg chg="add mod">
+          <ac:chgData name="Marc Johnston" userId="4bd435294172a9e0" providerId="LiveId" clId="{F93D44ED-375D-4FA9-90AA-824A0B780C8F}" dt="2023-07-18T01:03:00.581" v="949" actId="1076"/>
+          <ac:spMkLst>
+            <pc:docMk/>
+            <pc:sldMk cId="2233212922" sldId="257"/>
+            <ac:spMk id="29" creationId="{A1E3DD89-B89A-8EFC-799F-83AB20555B94}"/>
+          </ac:spMkLst>
+        </pc:spChg>
+        <pc:spChg chg="add mod">
+          <ac:chgData name="Marc Johnston" userId="4bd435294172a9e0" providerId="LiveId" clId="{F93D44ED-375D-4FA9-90AA-824A0B780C8F}" dt="2023-07-18T01:03:00.581" v="949" actId="1076"/>
+          <ac:spMkLst>
+            <pc:docMk/>
+            <pc:sldMk cId="2233212922" sldId="257"/>
+            <ac:spMk id="30" creationId="{A7035500-5107-341F-10AD-6490E25B3775}"/>
+          </ac:spMkLst>
+        </pc:spChg>
         <pc:cxnChg chg="mod">
-          <ac:chgData name="Marc Johnston" userId="4bd435294172a9e0" providerId="LiveId" clId="{F93D44ED-375D-4FA9-90AA-824A0B780C8F}" dt="2023-07-17T15:36:40.951" v="743" actId="14100"/>
+          <ac:chgData name="Marc Johnston" userId="4bd435294172a9e0" providerId="LiveId" clId="{F93D44ED-375D-4FA9-90AA-824A0B780C8F}" dt="2023-07-18T01:03:16.645" v="952" actId="1076"/>
+          <ac:cxnSpMkLst>
+            <pc:docMk/>
+            <pc:sldMk cId="2233212922" sldId="257"/>
+            <ac:cxnSpMk id="13" creationId="{AEC3F272-C444-08AE-D215-89066ED048F8}"/>
+          </ac:cxnSpMkLst>
+        </pc:cxnChg>
+        <pc:cxnChg chg="mod">
+          <ac:chgData name="Marc Johnston" userId="4bd435294172a9e0" providerId="LiveId" clId="{F93D44ED-375D-4FA9-90AA-824A0B780C8F}" dt="2023-07-18T01:03:16.645" v="952" actId="1076"/>
+          <ac:cxnSpMkLst>
+            <pc:docMk/>
+            <pc:sldMk cId="2233212922" sldId="257"/>
+            <ac:cxnSpMk id="16" creationId="{09139845-CBA0-8117-CA77-8764D191CCB4}"/>
+          </ac:cxnSpMkLst>
+        </pc:cxnChg>
+        <pc:cxnChg chg="add mod">
+          <ac:chgData name="Marc Johnston" userId="4bd435294172a9e0" providerId="LiveId" clId="{F93D44ED-375D-4FA9-90AA-824A0B780C8F}" dt="2023-07-18T01:08:57.567" v="955" actId="1076"/>
+          <ac:cxnSpMkLst>
+            <pc:docMk/>
+            <pc:sldMk cId="2233212922" sldId="257"/>
+            <ac:cxnSpMk id="17" creationId="{8FB44040-55B5-E07E-B264-F04292F19B74}"/>
+          </ac:cxnSpMkLst>
+        </pc:cxnChg>
+        <pc:cxnChg chg="mod">
+          <ac:chgData name="Marc Johnston" userId="4bd435294172a9e0" providerId="LiveId" clId="{F93D44ED-375D-4FA9-90AA-824A0B780C8F}" dt="2023-07-18T01:03:16.645" v="952" actId="1076"/>
+          <ac:cxnSpMkLst>
+            <pc:docMk/>
+            <pc:sldMk cId="2233212922" sldId="257"/>
+            <ac:cxnSpMk id="18" creationId="{6D3782EE-8A3E-EDB4-9F34-CA9C71943B53}"/>
+          </ac:cxnSpMkLst>
+        </pc:cxnChg>
+        <pc:cxnChg chg="add mod">
+          <ac:chgData name="Marc Johnston" userId="4bd435294172a9e0" providerId="LiveId" clId="{F93D44ED-375D-4FA9-90AA-824A0B780C8F}" dt="2023-07-18T01:02:28.032" v="945" actId="1076"/>
+          <ac:cxnSpMkLst>
+            <pc:docMk/>
+            <pc:sldMk cId="2233212922" sldId="257"/>
+            <ac:cxnSpMk id="19" creationId="{79E27562-CCCE-447B-E4DE-925B9E608267}"/>
+          </ac:cxnSpMkLst>
+        </pc:cxnChg>
+        <pc:cxnChg chg="del mod">
+          <ac:chgData name="Marc Johnston" userId="4bd435294172a9e0" providerId="LiveId" clId="{F93D44ED-375D-4FA9-90AA-824A0B780C8F}" dt="2023-07-18T01:09:00.040" v="956" actId="478"/>
           <ac:cxnSpMkLst>
             <pc:docMk/>
             <pc:sldMk cId="2233212922" sldId="257"/>
             <ac:cxnSpMk id="20" creationId="{DDD01F96-6F22-9191-0B13-D5D5BBE3F3BD}"/>
           </ac:cxnSpMkLst>
         </pc:cxnChg>
+        <pc:cxnChg chg="add mod">
+          <ac:chgData name="Marc Johnston" userId="4bd435294172a9e0" providerId="LiveId" clId="{F93D44ED-375D-4FA9-90AA-824A0B780C8F}" dt="2023-07-18T01:02:28.032" v="945" actId="1076"/>
+          <ac:cxnSpMkLst>
+            <pc:docMk/>
+            <pc:sldMk cId="2233212922" sldId="257"/>
+            <ac:cxnSpMk id="21" creationId="{B986D3F1-C796-8A7C-5146-405AD6A9AC75}"/>
+          </ac:cxnSpMkLst>
+        </pc:cxnChg>
         <pc:cxnChg chg="mod">
-          <ac:chgData name="Marc Johnston" userId="4bd435294172a9e0" providerId="LiveId" clId="{F93D44ED-375D-4FA9-90AA-824A0B780C8F}" dt="2023-07-17T15:36:40.951" v="743" actId="14100"/>
+          <ac:chgData name="Marc Johnston" userId="4bd435294172a9e0" providerId="LiveId" clId="{F93D44ED-375D-4FA9-90AA-824A0B780C8F}" dt="2023-07-18T01:09:03.779" v="957" actId="14100"/>
           <ac:cxnSpMkLst>
             <pc:docMk/>
             <pc:sldMk cId="2233212922" sldId="257"/>
@@ -185,7 +313,7 @@
           </ac:cxnSpMkLst>
         </pc:cxnChg>
         <pc:cxnChg chg="mod">
-          <ac:chgData name="Marc Johnston" userId="4bd435294172a9e0" providerId="LiveId" clId="{F93D44ED-375D-4FA9-90AA-824A0B780C8F}" dt="2023-07-17T15:30:17.600" v="288" actId="14100"/>
+          <ac:chgData name="Marc Johnston" userId="4bd435294172a9e0" providerId="LiveId" clId="{F93D44ED-375D-4FA9-90AA-824A0B780C8F}" dt="2023-07-18T01:02:40.635" v="946" actId="1076"/>
           <ac:cxnSpMkLst>
             <pc:docMk/>
             <pc:sldMk cId="2233212922" sldId="257"/>
@@ -193,11 +321,43 @@
           </ac:cxnSpMkLst>
         </pc:cxnChg>
         <pc:cxnChg chg="mod">
-          <ac:chgData name="Marc Johnston" userId="4bd435294172a9e0" providerId="LiveId" clId="{F93D44ED-375D-4FA9-90AA-824A0B780C8F}" dt="2023-07-17T15:30:17.600" v="288" actId="14100"/>
+          <ac:chgData name="Marc Johnston" userId="4bd435294172a9e0" providerId="LiveId" clId="{F93D44ED-375D-4FA9-90AA-824A0B780C8F}" dt="2023-07-18T01:02:40.635" v="946" actId="1076"/>
           <ac:cxnSpMkLst>
             <pc:docMk/>
             <pc:sldMk cId="2233212922" sldId="257"/>
             <ac:cxnSpMk id="26" creationId="{5A387D98-2263-5C90-86AD-6B3727A8CEAC}"/>
+          </ac:cxnSpMkLst>
+        </pc:cxnChg>
+        <pc:cxnChg chg="add mod">
+          <ac:chgData name="Marc Johnston" userId="4bd435294172a9e0" providerId="LiveId" clId="{F93D44ED-375D-4FA9-90AA-824A0B780C8F}" dt="2023-07-18T01:08:57.567" v="955" actId="1076"/>
+          <ac:cxnSpMkLst>
+            <pc:docMk/>
+            <pc:sldMk cId="2233212922" sldId="257"/>
+            <ac:cxnSpMk id="27" creationId="{3C517CF3-A8A5-ECDA-3C88-1825F1B85510}"/>
+          </ac:cxnSpMkLst>
+        </pc:cxnChg>
+        <pc:cxnChg chg="add mod">
+          <ac:chgData name="Marc Johnston" userId="4bd435294172a9e0" providerId="LiveId" clId="{F93D44ED-375D-4FA9-90AA-824A0B780C8F}" dt="2023-07-18T01:03:00.581" v="949" actId="1076"/>
+          <ac:cxnSpMkLst>
+            <pc:docMk/>
+            <pc:sldMk cId="2233212922" sldId="257"/>
+            <ac:cxnSpMk id="31" creationId="{7144A539-0F02-682B-3969-1B2EF727490F}"/>
+          </ac:cxnSpMkLst>
+        </pc:cxnChg>
+        <pc:cxnChg chg="add mod">
+          <ac:chgData name="Marc Johnston" userId="4bd435294172a9e0" providerId="LiveId" clId="{F93D44ED-375D-4FA9-90AA-824A0B780C8F}" dt="2023-07-18T01:03:00.581" v="949" actId="1076"/>
+          <ac:cxnSpMkLst>
+            <pc:docMk/>
+            <pc:sldMk cId="2233212922" sldId="257"/>
+            <ac:cxnSpMk id="32" creationId="{C8D79935-A19D-1EE1-6472-C6B93366D254}"/>
+          </ac:cxnSpMkLst>
+        </pc:cxnChg>
+        <pc:cxnChg chg="add">
+          <ac:chgData name="Marc Johnston" userId="4bd435294172a9e0" providerId="LiveId" clId="{F93D44ED-375D-4FA9-90AA-824A0B780C8F}" dt="2023-07-18T01:03:26.901" v="953" actId="11529"/>
+          <ac:cxnSpMkLst>
+            <pc:docMk/>
+            <pc:sldMk cId="2233212922" sldId="257"/>
+            <ac:cxnSpMk id="35" creationId="{C126DB57-E201-CEE9-0A7C-4EDF448659B9}"/>
           </ac:cxnSpMkLst>
         </pc:cxnChg>
       </pc:sldChg>
@@ -3553,7 +3713,7 @@
         </p:nvSpPr>
         <p:spPr>
           <a:xfrm>
-            <a:off x="4760335" y="1404365"/>
+            <a:off x="2420655" y="1410968"/>
             <a:ext cx="2671329" cy="380010"/>
           </a:xfrm>
           <a:prstGeom prst="rect">
@@ -3610,7 +3770,7 @@
         </p:nvSpPr>
         <p:spPr>
           <a:xfrm>
-            <a:off x="4202688" y="2032062"/>
+            <a:off x="1863008" y="2038665"/>
             <a:ext cx="3786621" cy="390439"/>
           </a:xfrm>
           <a:prstGeom prst="rect">
@@ -3748,7 +3908,7 @@
         </p:nvSpPr>
         <p:spPr>
           <a:xfrm>
-            <a:off x="4026041" y="2670188"/>
+            <a:off x="1686361" y="2676791"/>
             <a:ext cx="4139912" cy="390439"/>
           </a:xfrm>
           <a:prstGeom prst="rect">
@@ -3817,10 +3977,10 @@
       </p:sp>
       <p:sp>
         <p:nvSpPr>
-          <p:cNvPr id="8" name="Rectangle 7">
-            <a:extLst>
-              <a:ext uri="{FF2B5EF4-FFF2-40B4-BE49-F238E27FC236}">
-                <a16:creationId xmlns:a16="http://schemas.microsoft.com/office/drawing/2014/main" id="{759871E1-1E6C-67C2-77F8-2483DE2C4658}"/>
+          <p:cNvPr id="9" name="Rectangle 8">
+            <a:extLst>
+              <a:ext uri="{FF2B5EF4-FFF2-40B4-BE49-F238E27FC236}">
+                <a16:creationId xmlns:a16="http://schemas.microsoft.com/office/drawing/2014/main" id="{FECA6C2C-07F6-C103-7A6B-63F8FB5CC506}"/>
               </a:ext>
             </a:extLst>
           </p:cNvPr>
@@ -3829,7 +3989,493 @@
         </p:nvSpPr>
         <p:spPr>
           <a:xfrm>
-            <a:off x="3902649" y="3948616"/>
+            <a:off x="1439578" y="4587830"/>
+            <a:ext cx="4386696" cy="390439"/>
+          </a:xfrm>
+          <a:prstGeom prst="rect">
+            <a:avLst/>
+          </a:prstGeom>
+        </p:spPr>
+        <p:style>
+          <a:lnRef idx="2">
+            <a:schemeClr val="accent1">
+              <a:shade val="15000"/>
+            </a:schemeClr>
+          </a:lnRef>
+          <a:fillRef idx="1">
+            <a:schemeClr val="accent1"/>
+          </a:fillRef>
+          <a:effectRef idx="0">
+            <a:schemeClr val="accent1"/>
+          </a:effectRef>
+          <a:fontRef idx="minor">
+            <a:schemeClr val="lt1"/>
+          </a:fontRef>
+        </p:style>
+        <p:txBody>
+          <a:bodyPr rtlCol="0" anchor="ctr"/>
+          <a:lstStyle/>
+          <a:p>
+            <a:pPr algn="ctr"/>
+            <a:r>
+              <a:rPr lang="en-US" sz="1200" dirty="0" err="1"/>
+              <a:t>AngbandOS.Web.PlayComponent.ts</a:t>
+            </a:r>
+            <a:endParaRPr lang="en-US" sz="1200" dirty="0"/>
+          </a:p>
+          <a:p>
+            <a:pPr algn="ctr"/>
+            <a:r>
+              <a:rPr lang="en-US" sz="700" dirty="0"/>
+              <a:t>This is the client-side component and screen for the game console.  It connects to a </a:t>
+            </a:r>
+            <a:r>
+              <a:rPr lang="en-US" sz="700" dirty="0" err="1"/>
+              <a:t>GameHub</a:t>
+            </a:r>
+            <a:r>
+              <a:rPr lang="en-US" sz="700" dirty="0"/>
+              <a:t> using a signal-r connection.  It uses an </a:t>
+            </a:r>
+            <a:r>
+              <a:rPr lang="en-US" sz="700" dirty="0" err="1"/>
+              <a:t>HtmlConsoleComponent</a:t>
+            </a:r>
+            <a:r>
+              <a:rPr lang="en-US" sz="700" dirty="0"/>
+              <a:t> object to handle the </a:t>
+            </a:r>
+            <a:r>
+              <a:rPr lang="en-US" sz="700" dirty="0" err="1"/>
+              <a:t>HTMLCanvas</a:t>
+            </a:r>
+            <a:r>
+              <a:rPr lang="en-US" sz="700" dirty="0"/>
+              <a:t> rendering.</a:t>
+            </a:r>
+          </a:p>
+        </p:txBody>
+      </p:sp>
+      <p:sp>
+        <p:nvSpPr>
+          <p:cNvPr id="10" name="Rectangle 9">
+            <a:extLst>
+              <a:ext uri="{FF2B5EF4-FFF2-40B4-BE49-F238E27FC236}">
+                <a16:creationId xmlns:a16="http://schemas.microsoft.com/office/drawing/2014/main" id="{4C12BEFF-E90E-1D70-62F7-4BEDF3D77363}"/>
+              </a:ext>
+            </a:extLst>
+          </p:cNvPr>
+          <p:cNvSpPr/>
+          <p:nvPr/>
+        </p:nvSpPr>
+        <p:spPr>
+          <a:xfrm>
+            <a:off x="1439578" y="5228862"/>
+            <a:ext cx="4386696" cy="390440"/>
+          </a:xfrm>
+          <a:prstGeom prst="rect">
+            <a:avLst/>
+          </a:prstGeom>
+        </p:spPr>
+        <p:style>
+          <a:lnRef idx="2">
+            <a:schemeClr val="accent1">
+              <a:shade val="15000"/>
+            </a:schemeClr>
+          </a:lnRef>
+          <a:fillRef idx="1">
+            <a:schemeClr val="accent1"/>
+          </a:fillRef>
+          <a:effectRef idx="0">
+            <a:schemeClr val="accent1"/>
+          </a:effectRef>
+          <a:fontRef idx="minor">
+            <a:schemeClr val="lt1"/>
+          </a:fontRef>
+        </p:style>
+        <p:txBody>
+          <a:bodyPr rtlCol="0" anchor="ctr"/>
+          <a:lstStyle/>
+          <a:p>
+            <a:pPr algn="ctr"/>
+            <a:r>
+              <a:rPr lang="en-US" sz="1200" dirty="0" err="1"/>
+              <a:t>AngbandOS.Web.HtmlConsoleComponent</a:t>
+            </a:r>
+            <a:endParaRPr lang="en-US" sz="1200" dirty="0"/>
+          </a:p>
+          <a:p>
+            <a:pPr algn="ctr"/>
+            <a:r>
+              <a:rPr lang="en-US" sz="700" dirty="0"/>
+              <a:t>This is a client-side typescript object that accepts and wraps the </a:t>
+            </a:r>
+            <a:r>
+              <a:rPr lang="en-US" sz="700" dirty="0" err="1"/>
+              <a:t>HTMLCanvas</a:t>
+            </a:r>
+            <a:r>
+              <a:rPr lang="en-US" sz="700" dirty="0"/>
+              <a:t> element and handles all of the </a:t>
+            </a:r>
+            <a:r>
+              <a:rPr lang="en-US" sz="700" dirty="0" err="1"/>
+              <a:t>HTMLCanvas</a:t>
+            </a:r>
+            <a:r>
+              <a:rPr lang="en-US" sz="700" dirty="0"/>
+              <a:t> interactions.  This component is used by both the </a:t>
+            </a:r>
+            <a:r>
+              <a:rPr lang="en-US" sz="700" dirty="0" err="1"/>
+              <a:t>PlayComponent</a:t>
+            </a:r>
+            <a:r>
+              <a:rPr lang="en-US" sz="700" dirty="0"/>
+              <a:t> and the </a:t>
+            </a:r>
+            <a:r>
+              <a:rPr lang="en-US" sz="700" dirty="0" err="1"/>
+              <a:t>WatchComponent</a:t>
+            </a:r>
+            <a:r>
+              <a:rPr lang="en-US" sz="700" dirty="0"/>
+              <a:t>.</a:t>
+            </a:r>
+          </a:p>
+        </p:txBody>
+      </p:sp>
+      <p:sp>
+        <p:nvSpPr>
+          <p:cNvPr id="11" name="Rectangle 10">
+            <a:extLst>
+              <a:ext uri="{FF2B5EF4-FFF2-40B4-BE49-F238E27FC236}">
+                <a16:creationId xmlns:a16="http://schemas.microsoft.com/office/drawing/2014/main" id="{B1FBD51A-3396-DA46-4DB6-1B2110DB7C65}"/>
+              </a:ext>
+            </a:extLst>
+          </p:cNvPr>
+          <p:cNvSpPr/>
+          <p:nvPr/>
+        </p:nvSpPr>
+        <p:spPr>
+          <a:xfrm>
+            <a:off x="2266521" y="5872735"/>
+            <a:ext cx="2732810" cy="390440"/>
+          </a:xfrm>
+          <a:prstGeom prst="rect">
+            <a:avLst/>
+          </a:prstGeom>
+        </p:spPr>
+        <p:style>
+          <a:lnRef idx="2">
+            <a:schemeClr val="accent1">
+              <a:shade val="15000"/>
+            </a:schemeClr>
+          </a:lnRef>
+          <a:fillRef idx="1">
+            <a:schemeClr val="accent1"/>
+          </a:fillRef>
+          <a:effectRef idx="0">
+            <a:schemeClr val="accent1"/>
+          </a:effectRef>
+          <a:fontRef idx="minor">
+            <a:schemeClr val="lt1"/>
+          </a:fontRef>
+        </p:style>
+        <p:txBody>
+          <a:bodyPr rtlCol="0" anchor="ctr"/>
+          <a:lstStyle/>
+          <a:p>
+            <a:pPr algn="ctr"/>
+            <a:r>
+              <a:rPr lang="en-US" sz="1200" dirty="0" err="1"/>
+              <a:t>HTMLCanvas</a:t>
+            </a:r>
+            <a:endParaRPr lang="en-US" sz="1200" dirty="0"/>
+          </a:p>
+          <a:p>
+            <a:pPr algn="ctr"/>
+            <a:r>
+              <a:rPr lang="en-US" sz="700" dirty="0"/>
+              <a:t>This is the HTML component that renders the game on the browser.</a:t>
+            </a:r>
+            <a:endParaRPr lang="en-US" sz="100" dirty="0"/>
+          </a:p>
+        </p:txBody>
+      </p:sp>
+      <p:cxnSp>
+        <p:nvCxnSpPr>
+          <p:cNvPr id="13" name="Straight Arrow Connector 12">
+            <a:extLst>
+              <a:ext uri="{FF2B5EF4-FFF2-40B4-BE49-F238E27FC236}">
+                <a16:creationId xmlns:a16="http://schemas.microsoft.com/office/drawing/2014/main" id="{AEC3F272-C444-08AE-D215-89066ED048F8}"/>
+              </a:ext>
+            </a:extLst>
+          </p:cNvPr>
+          <p:cNvCxnSpPr>
+            <a:cxnSpLocks/>
+            <a:stCxn id="4" idx="2"/>
+            <a:endCxn id="5" idx="0"/>
+          </p:cNvCxnSpPr>
+          <p:nvPr/>
+        </p:nvCxnSpPr>
+        <p:spPr>
+          <a:xfrm flipH="1">
+            <a:off x="3756319" y="1790978"/>
+            <a:ext cx="1" cy="247687"/>
+          </a:xfrm>
+          <a:prstGeom prst="straightConnector1">
+            <a:avLst/>
+          </a:prstGeom>
+          <a:ln>
+            <a:tailEnd type="triangle"/>
+          </a:ln>
+        </p:spPr>
+        <p:style>
+          <a:lnRef idx="1">
+            <a:schemeClr val="accent1"/>
+          </a:lnRef>
+          <a:fillRef idx="0">
+            <a:schemeClr val="accent1"/>
+          </a:fillRef>
+          <a:effectRef idx="0">
+            <a:schemeClr val="accent1"/>
+          </a:effectRef>
+          <a:fontRef idx="minor">
+            <a:schemeClr val="tx1"/>
+          </a:fontRef>
+        </p:style>
+      </p:cxnSp>
+      <p:cxnSp>
+        <p:nvCxnSpPr>
+          <p:cNvPr id="16" name="Straight Arrow Connector 15">
+            <a:extLst>
+              <a:ext uri="{FF2B5EF4-FFF2-40B4-BE49-F238E27FC236}">
+                <a16:creationId xmlns:a16="http://schemas.microsoft.com/office/drawing/2014/main" id="{09139845-CBA0-8117-CA77-8764D191CCB4}"/>
+              </a:ext>
+            </a:extLst>
+          </p:cNvPr>
+          <p:cNvCxnSpPr>
+            <a:cxnSpLocks/>
+            <a:stCxn id="5" idx="2"/>
+            <a:endCxn id="7" idx="0"/>
+          </p:cNvCxnSpPr>
+          <p:nvPr/>
+        </p:nvCxnSpPr>
+        <p:spPr>
+          <a:xfrm flipH="1">
+            <a:off x="3756317" y="2429104"/>
+            <a:ext cx="2" cy="247687"/>
+          </a:xfrm>
+          <a:prstGeom prst="straightConnector1">
+            <a:avLst/>
+          </a:prstGeom>
+          <a:ln>
+            <a:tailEnd type="triangle"/>
+          </a:ln>
+        </p:spPr>
+        <p:style>
+          <a:lnRef idx="1">
+            <a:schemeClr val="accent1"/>
+          </a:lnRef>
+          <a:fillRef idx="0">
+            <a:schemeClr val="accent1"/>
+          </a:fillRef>
+          <a:effectRef idx="0">
+            <a:schemeClr val="accent1"/>
+          </a:effectRef>
+          <a:fontRef idx="minor">
+            <a:schemeClr val="tx1"/>
+          </a:fontRef>
+        </p:style>
+      </p:cxnSp>
+      <p:cxnSp>
+        <p:nvCxnSpPr>
+          <p:cNvPr id="18" name="Straight Arrow Connector 17">
+            <a:extLst>
+              <a:ext uri="{FF2B5EF4-FFF2-40B4-BE49-F238E27FC236}">
+                <a16:creationId xmlns:a16="http://schemas.microsoft.com/office/drawing/2014/main" id="{6D3782EE-8A3E-EDB4-9F34-CA9C71943B53}"/>
+              </a:ext>
+            </a:extLst>
+          </p:cNvPr>
+          <p:cNvCxnSpPr>
+            <a:cxnSpLocks/>
+            <a:stCxn id="7" idx="2"/>
+            <a:endCxn id="6" idx="0"/>
+          </p:cNvCxnSpPr>
+          <p:nvPr/>
+        </p:nvCxnSpPr>
+        <p:spPr>
+          <a:xfrm>
+            <a:off x="3756317" y="3067230"/>
+            <a:ext cx="2339681" cy="242172"/>
+          </a:xfrm>
+          <a:prstGeom prst="straightConnector1">
+            <a:avLst/>
+          </a:prstGeom>
+          <a:ln>
+            <a:tailEnd type="triangle"/>
+          </a:ln>
+        </p:spPr>
+        <p:style>
+          <a:lnRef idx="1">
+            <a:schemeClr val="accent1"/>
+          </a:lnRef>
+          <a:fillRef idx="0">
+            <a:schemeClr val="accent1"/>
+          </a:fillRef>
+          <a:effectRef idx="0">
+            <a:schemeClr val="accent1"/>
+          </a:effectRef>
+          <a:fontRef idx="minor">
+            <a:schemeClr val="tx1"/>
+          </a:fontRef>
+        </p:style>
+      </p:cxnSp>
+      <p:cxnSp>
+        <p:nvCxnSpPr>
+          <p:cNvPr id="22" name="Straight Arrow Connector 21">
+            <a:extLst>
+              <a:ext uri="{FF2B5EF4-FFF2-40B4-BE49-F238E27FC236}">
+                <a16:creationId xmlns:a16="http://schemas.microsoft.com/office/drawing/2014/main" id="{C4E392C9-13B0-F3F7-A581-7D0A42B01EE2}"/>
+              </a:ext>
+            </a:extLst>
+          </p:cNvPr>
+          <p:cNvCxnSpPr>
+            <a:cxnSpLocks/>
+            <a:stCxn id="3" idx="2"/>
+            <a:endCxn id="9" idx="0"/>
+          </p:cNvCxnSpPr>
+          <p:nvPr/>
+        </p:nvCxnSpPr>
+        <p:spPr>
+          <a:xfrm flipH="1">
+            <a:off x="3632926" y="4348614"/>
+            <a:ext cx="2463071" cy="239216"/>
+          </a:xfrm>
+          <a:prstGeom prst="straightConnector1">
+            <a:avLst/>
+          </a:prstGeom>
+          <a:ln>
+            <a:tailEnd type="triangle"/>
+          </a:ln>
+        </p:spPr>
+        <p:style>
+          <a:lnRef idx="1">
+            <a:schemeClr val="accent1"/>
+          </a:lnRef>
+          <a:fillRef idx="0">
+            <a:schemeClr val="accent1"/>
+          </a:fillRef>
+          <a:effectRef idx="0">
+            <a:schemeClr val="accent1"/>
+          </a:effectRef>
+          <a:fontRef idx="minor">
+            <a:schemeClr val="tx1"/>
+          </a:fontRef>
+        </p:style>
+      </p:cxnSp>
+      <p:cxnSp>
+        <p:nvCxnSpPr>
+          <p:cNvPr id="24" name="Straight Arrow Connector 23">
+            <a:extLst>
+              <a:ext uri="{FF2B5EF4-FFF2-40B4-BE49-F238E27FC236}">
+                <a16:creationId xmlns:a16="http://schemas.microsoft.com/office/drawing/2014/main" id="{06A53A37-00F2-6F4B-C9E9-6F406A44949E}"/>
+              </a:ext>
+            </a:extLst>
+          </p:cNvPr>
+          <p:cNvCxnSpPr>
+            <a:cxnSpLocks/>
+            <a:stCxn id="9" idx="2"/>
+            <a:endCxn id="10" idx="0"/>
+          </p:cNvCxnSpPr>
+          <p:nvPr/>
+        </p:nvCxnSpPr>
+        <p:spPr>
+          <a:xfrm>
+            <a:off x="3632926" y="4978269"/>
+            <a:ext cx="0" cy="250593"/>
+          </a:xfrm>
+          <a:prstGeom prst="straightConnector1">
+            <a:avLst/>
+          </a:prstGeom>
+          <a:ln>
+            <a:tailEnd type="triangle"/>
+          </a:ln>
+        </p:spPr>
+        <p:style>
+          <a:lnRef idx="1">
+            <a:schemeClr val="accent1"/>
+          </a:lnRef>
+          <a:fillRef idx="0">
+            <a:schemeClr val="accent1"/>
+          </a:fillRef>
+          <a:effectRef idx="0">
+            <a:schemeClr val="accent1"/>
+          </a:effectRef>
+          <a:fontRef idx="minor">
+            <a:schemeClr val="tx1"/>
+          </a:fontRef>
+        </p:style>
+      </p:cxnSp>
+      <p:cxnSp>
+        <p:nvCxnSpPr>
+          <p:cNvPr id="26" name="Straight Arrow Connector 25">
+            <a:extLst>
+              <a:ext uri="{FF2B5EF4-FFF2-40B4-BE49-F238E27FC236}">
+                <a16:creationId xmlns:a16="http://schemas.microsoft.com/office/drawing/2014/main" id="{5A387D98-2263-5C90-86AD-6B3727A8CEAC}"/>
+              </a:ext>
+            </a:extLst>
+          </p:cNvPr>
+          <p:cNvCxnSpPr>
+            <a:cxnSpLocks/>
+            <a:stCxn id="10" idx="2"/>
+            <a:endCxn id="11" idx="0"/>
+          </p:cNvCxnSpPr>
+          <p:nvPr/>
+        </p:nvCxnSpPr>
+        <p:spPr>
+          <a:xfrm>
+            <a:off x="3632926" y="5619302"/>
+            <a:ext cx="0" cy="253433"/>
+          </a:xfrm>
+          <a:prstGeom prst="straightConnector1">
+            <a:avLst/>
+          </a:prstGeom>
+          <a:ln>
+            <a:tailEnd type="triangle"/>
+          </a:ln>
+        </p:spPr>
+        <p:style>
+          <a:lnRef idx="1">
+            <a:schemeClr val="accent1"/>
+          </a:lnRef>
+          <a:fillRef idx="0">
+            <a:schemeClr val="accent1"/>
+          </a:fillRef>
+          <a:effectRef idx="0">
+            <a:schemeClr val="accent1"/>
+          </a:effectRef>
+          <a:fontRef idx="minor">
+            <a:schemeClr val="tx1"/>
+          </a:fontRef>
+        </p:style>
+      </p:cxnSp>
+      <p:sp>
+        <p:nvSpPr>
+          <p:cNvPr id="3" name="Rectangle 2">
+            <a:extLst>
+              <a:ext uri="{FF2B5EF4-FFF2-40B4-BE49-F238E27FC236}">
+                <a16:creationId xmlns:a16="http://schemas.microsoft.com/office/drawing/2014/main" id="{472FE763-C632-39E0-CC24-E3FEAEABA863}"/>
+              </a:ext>
+            </a:extLst>
+          </p:cNvPr>
+          <p:cNvSpPr/>
+          <p:nvPr/>
+        </p:nvSpPr>
+        <p:spPr>
+          <a:xfrm>
+            <a:off x="3902649" y="3958175"/>
             <a:ext cx="4386695" cy="390439"/>
           </a:xfrm>
           <a:prstGeom prst="rect">
@@ -3890,10 +4536,10 @@
       </p:sp>
       <p:sp>
         <p:nvSpPr>
-          <p:cNvPr id="9" name="Rectangle 8">
-            <a:extLst>
-              <a:ext uri="{FF2B5EF4-FFF2-40B4-BE49-F238E27FC236}">
-                <a16:creationId xmlns:a16="http://schemas.microsoft.com/office/drawing/2014/main" id="{FECA6C2C-07F6-C103-7A6B-63F8FB5CC506}"/>
+          <p:cNvPr id="12" name="Rectangle 11">
+            <a:extLst>
+              <a:ext uri="{FF2B5EF4-FFF2-40B4-BE49-F238E27FC236}">
+                <a16:creationId xmlns:a16="http://schemas.microsoft.com/office/drawing/2014/main" id="{7EBD8B86-B21B-910D-94A8-8A462016F5A2}"/>
               </a:ext>
             </a:extLst>
           </p:cNvPr>
@@ -3902,7 +4548,7 @@
         </p:nvSpPr>
         <p:spPr>
           <a:xfrm>
-            <a:off x="3902649" y="4587830"/>
+            <a:off x="6365727" y="4587830"/>
             <a:ext cx="4386696" cy="390439"/>
           </a:xfrm>
           <a:prstGeom prst="rect">
@@ -3971,10 +4617,10 @@
       </p:sp>
       <p:sp>
         <p:nvSpPr>
-          <p:cNvPr id="10" name="Rectangle 9">
-            <a:extLst>
-              <a:ext uri="{FF2B5EF4-FFF2-40B4-BE49-F238E27FC236}">
-                <a16:creationId xmlns:a16="http://schemas.microsoft.com/office/drawing/2014/main" id="{4C12BEFF-E90E-1D70-62F7-4BEDF3D77363}"/>
+          <p:cNvPr id="14" name="Rectangle 13">
+            <a:extLst>
+              <a:ext uri="{FF2B5EF4-FFF2-40B4-BE49-F238E27FC236}">
+                <a16:creationId xmlns:a16="http://schemas.microsoft.com/office/drawing/2014/main" id="{AE3440A7-CE35-E404-B1AA-B675A983A11F}"/>
               </a:ext>
             </a:extLst>
           </p:cNvPr>
@@ -3983,7 +4629,7 @@
         </p:nvSpPr>
         <p:spPr>
           <a:xfrm>
-            <a:off x="3902649" y="5228862"/>
+            <a:off x="6365727" y="5228862"/>
             <a:ext cx="4386696" cy="390440"/>
           </a:xfrm>
           <a:prstGeom prst="rect">
@@ -4060,10 +4706,10 @@
       </p:sp>
       <p:sp>
         <p:nvSpPr>
-          <p:cNvPr id="11" name="Rectangle 10">
-            <a:extLst>
-              <a:ext uri="{FF2B5EF4-FFF2-40B4-BE49-F238E27FC236}">
-                <a16:creationId xmlns:a16="http://schemas.microsoft.com/office/drawing/2014/main" id="{B1FBD51A-3396-DA46-4DB6-1B2110DB7C65}"/>
+          <p:cNvPr id="15" name="Rectangle 14">
+            <a:extLst>
+              <a:ext uri="{FF2B5EF4-FFF2-40B4-BE49-F238E27FC236}">
+                <a16:creationId xmlns:a16="http://schemas.microsoft.com/office/drawing/2014/main" id="{23F010BA-0A3E-2D9D-C5D0-198753767110}"/>
               </a:ext>
             </a:extLst>
           </p:cNvPr>
@@ -4072,7 +4718,7 @@
         </p:nvSpPr>
         <p:spPr>
           <a:xfrm>
-            <a:off x="4729592" y="5872735"/>
+            <a:off x="7192670" y="5872735"/>
             <a:ext cx="2732810" cy="390440"/>
           </a:xfrm>
           <a:prstGeom prst="rect">
@@ -4118,23 +4764,397 @@
       </p:sp>
       <p:cxnSp>
         <p:nvCxnSpPr>
-          <p:cNvPr id="13" name="Straight Arrow Connector 12">
-            <a:extLst>
-              <a:ext uri="{FF2B5EF4-FFF2-40B4-BE49-F238E27FC236}">
-                <a16:creationId xmlns:a16="http://schemas.microsoft.com/office/drawing/2014/main" id="{AEC3F272-C444-08AE-D215-89066ED048F8}"/>
+          <p:cNvPr id="17" name="Straight Arrow Connector 16">
+            <a:extLst>
+              <a:ext uri="{FF2B5EF4-FFF2-40B4-BE49-F238E27FC236}">
+                <a16:creationId xmlns:a16="http://schemas.microsoft.com/office/drawing/2014/main" id="{8FB44040-55B5-E07E-B264-F04292F19B74}"/>
               </a:ext>
             </a:extLst>
           </p:cNvPr>
           <p:cNvCxnSpPr>
             <a:cxnSpLocks/>
-            <a:stCxn id="4" idx="2"/>
-            <a:endCxn id="5" idx="0"/>
+            <a:stCxn id="3" idx="2"/>
+            <a:endCxn id="12" idx="0"/>
+          </p:cNvCxnSpPr>
+          <p:nvPr/>
+        </p:nvCxnSpPr>
+        <p:spPr>
+          <a:xfrm>
+            <a:off x="6095997" y="4348614"/>
+            <a:ext cx="2463078" cy="239216"/>
+          </a:xfrm>
+          <a:prstGeom prst="straightConnector1">
+            <a:avLst/>
+          </a:prstGeom>
+          <a:ln>
+            <a:tailEnd type="triangle"/>
+          </a:ln>
+        </p:spPr>
+        <p:style>
+          <a:lnRef idx="1">
+            <a:schemeClr val="accent1"/>
+          </a:lnRef>
+          <a:fillRef idx="0">
+            <a:schemeClr val="accent1"/>
+          </a:fillRef>
+          <a:effectRef idx="0">
+            <a:schemeClr val="accent1"/>
+          </a:effectRef>
+          <a:fontRef idx="minor">
+            <a:schemeClr val="tx1"/>
+          </a:fontRef>
+        </p:style>
+      </p:cxnSp>
+      <p:cxnSp>
+        <p:nvCxnSpPr>
+          <p:cNvPr id="19" name="Straight Arrow Connector 18">
+            <a:extLst>
+              <a:ext uri="{FF2B5EF4-FFF2-40B4-BE49-F238E27FC236}">
+                <a16:creationId xmlns:a16="http://schemas.microsoft.com/office/drawing/2014/main" id="{79E27562-CCCE-447B-E4DE-925B9E608267}"/>
+              </a:ext>
+            </a:extLst>
+          </p:cNvPr>
+          <p:cNvCxnSpPr>
+            <a:cxnSpLocks/>
+            <a:stCxn id="12" idx="2"/>
+            <a:endCxn id="14" idx="0"/>
+          </p:cNvCxnSpPr>
+          <p:nvPr/>
+        </p:nvCxnSpPr>
+        <p:spPr>
+          <a:xfrm>
+            <a:off x="8559075" y="4978269"/>
+            <a:ext cx="0" cy="250593"/>
+          </a:xfrm>
+          <a:prstGeom prst="straightConnector1">
+            <a:avLst/>
+          </a:prstGeom>
+          <a:ln>
+            <a:tailEnd type="triangle"/>
+          </a:ln>
+        </p:spPr>
+        <p:style>
+          <a:lnRef idx="1">
+            <a:schemeClr val="accent1"/>
+          </a:lnRef>
+          <a:fillRef idx="0">
+            <a:schemeClr val="accent1"/>
+          </a:fillRef>
+          <a:effectRef idx="0">
+            <a:schemeClr val="accent1"/>
+          </a:effectRef>
+          <a:fontRef idx="minor">
+            <a:schemeClr val="tx1"/>
+          </a:fontRef>
+        </p:style>
+      </p:cxnSp>
+      <p:cxnSp>
+        <p:nvCxnSpPr>
+          <p:cNvPr id="21" name="Straight Arrow Connector 20">
+            <a:extLst>
+              <a:ext uri="{FF2B5EF4-FFF2-40B4-BE49-F238E27FC236}">
+                <a16:creationId xmlns:a16="http://schemas.microsoft.com/office/drawing/2014/main" id="{B986D3F1-C796-8A7C-5146-405AD6A9AC75}"/>
+              </a:ext>
+            </a:extLst>
+          </p:cNvPr>
+          <p:cNvCxnSpPr>
+            <a:cxnSpLocks/>
+            <a:stCxn id="14" idx="2"/>
+            <a:endCxn id="15" idx="0"/>
+          </p:cNvCxnSpPr>
+          <p:nvPr/>
+        </p:nvCxnSpPr>
+        <p:spPr>
+          <a:xfrm>
+            <a:off x="8559075" y="5619302"/>
+            <a:ext cx="0" cy="253433"/>
+          </a:xfrm>
+          <a:prstGeom prst="straightConnector1">
+            <a:avLst/>
+          </a:prstGeom>
+          <a:ln>
+            <a:tailEnd type="triangle"/>
+          </a:ln>
+        </p:spPr>
+        <p:style>
+          <a:lnRef idx="1">
+            <a:schemeClr val="accent1"/>
+          </a:lnRef>
+          <a:fillRef idx="0">
+            <a:schemeClr val="accent1"/>
+          </a:fillRef>
+          <a:effectRef idx="0">
+            <a:schemeClr val="accent1"/>
+          </a:effectRef>
+          <a:fontRef idx="minor">
+            <a:schemeClr val="tx1"/>
+          </a:fontRef>
+        </p:style>
+      </p:cxnSp>
+      <p:cxnSp>
+        <p:nvCxnSpPr>
+          <p:cNvPr id="27" name="Straight Arrow Connector 26">
+            <a:extLst>
+              <a:ext uri="{FF2B5EF4-FFF2-40B4-BE49-F238E27FC236}">
+                <a16:creationId xmlns:a16="http://schemas.microsoft.com/office/drawing/2014/main" id="{3C517CF3-A8A5-ECDA-3C88-1825F1B85510}"/>
+              </a:ext>
+            </a:extLst>
+          </p:cNvPr>
+          <p:cNvCxnSpPr>
+            <a:stCxn id="6" idx="2"/>
+            <a:endCxn id="3" idx="0"/>
           </p:cNvCxnSpPr>
           <p:nvPr/>
         </p:nvCxnSpPr>
         <p:spPr>
           <a:xfrm flipH="1">
-            <a:off x="6095999" y="1784375"/>
+            <a:off x="6095997" y="3699841"/>
+            <a:ext cx="1" cy="258334"/>
+          </a:xfrm>
+          <a:prstGeom prst="straightConnector1">
+            <a:avLst/>
+          </a:prstGeom>
+          <a:ln>
+            <a:tailEnd type="triangle"/>
+          </a:ln>
+        </p:spPr>
+        <p:style>
+          <a:lnRef idx="1">
+            <a:schemeClr val="accent1"/>
+          </a:lnRef>
+          <a:fillRef idx="0">
+            <a:schemeClr val="accent1"/>
+          </a:fillRef>
+          <a:effectRef idx="0">
+            <a:schemeClr val="accent1"/>
+          </a:effectRef>
+          <a:fontRef idx="minor">
+            <a:schemeClr val="tx1"/>
+          </a:fontRef>
+        </p:style>
+      </p:cxnSp>
+      <p:sp>
+        <p:nvSpPr>
+          <p:cNvPr id="28" name="Rectangle 27">
+            <a:extLst>
+              <a:ext uri="{FF2B5EF4-FFF2-40B4-BE49-F238E27FC236}">
+                <a16:creationId xmlns:a16="http://schemas.microsoft.com/office/drawing/2014/main" id="{C41F0AA0-E02D-0BBD-4248-554AB051E6C8}"/>
+              </a:ext>
+            </a:extLst>
+          </p:cNvPr>
+          <p:cNvSpPr/>
+          <p:nvPr/>
+        </p:nvSpPr>
+        <p:spPr>
+          <a:xfrm>
+            <a:off x="7100021" y="1410968"/>
+            <a:ext cx="2671329" cy="380010"/>
+          </a:xfrm>
+          <a:prstGeom prst="rect">
+            <a:avLst/>
+          </a:prstGeom>
+        </p:spPr>
+        <p:style>
+          <a:lnRef idx="2">
+            <a:schemeClr val="accent1">
+              <a:shade val="15000"/>
+            </a:schemeClr>
+          </a:lnRef>
+          <a:fillRef idx="1">
+            <a:schemeClr val="accent1"/>
+          </a:fillRef>
+          <a:effectRef idx="0">
+            <a:schemeClr val="accent1"/>
+          </a:effectRef>
+          <a:fontRef idx="minor">
+            <a:schemeClr val="lt1"/>
+          </a:fontRef>
+        </p:style>
+        <p:txBody>
+          <a:bodyPr rtlCol="0" anchor="ctr"/>
+          <a:lstStyle/>
+          <a:p>
+            <a:pPr algn="ctr"/>
+            <a:r>
+              <a:rPr lang="en-US" sz="1200" dirty="0" err="1"/>
+              <a:t>AngbandOS.Core</a:t>
+            </a:r>
+            <a:endParaRPr lang="en-US" sz="1200" dirty="0"/>
+          </a:p>
+          <a:p>
+            <a:pPr algn="ctr"/>
+            <a:r>
+              <a:rPr lang="en-US" sz="700" dirty="0"/>
+              <a:t>This is the DLL that implements the core of the game functionality.</a:t>
+            </a:r>
+          </a:p>
+        </p:txBody>
+      </p:sp>
+      <p:sp>
+        <p:nvSpPr>
+          <p:cNvPr id="29" name="Rectangle 28">
+            <a:extLst>
+              <a:ext uri="{FF2B5EF4-FFF2-40B4-BE49-F238E27FC236}">
+                <a16:creationId xmlns:a16="http://schemas.microsoft.com/office/drawing/2014/main" id="{A1E3DD89-B89A-8EFC-799F-83AB20555B94}"/>
+              </a:ext>
+            </a:extLst>
+          </p:cNvPr>
+          <p:cNvSpPr/>
+          <p:nvPr/>
+        </p:nvSpPr>
+        <p:spPr>
+          <a:xfrm>
+            <a:off x="6542374" y="2038665"/>
+            <a:ext cx="3786621" cy="390439"/>
+          </a:xfrm>
+          <a:prstGeom prst="rect">
+            <a:avLst/>
+          </a:prstGeom>
+        </p:spPr>
+        <p:style>
+          <a:lnRef idx="2">
+            <a:schemeClr val="accent1">
+              <a:shade val="15000"/>
+            </a:schemeClr>
+          </a:lnRef>
+          <a:fillRef idx="1">
+            <a:schemeClr val="accent1"/>
+          </a:fillRef>
+          <a:effectRef idx="0">
+            <a:schemeClr val="accent1"/>
+          </a:effectRef>
+          <a:fontRef idx="minor">
+            <a:schemeClr val="lt1"/>
+          </a:fontRef>
+        </p:style>
+        <p:txBody>
+          <a:bodyPr rtlCol="0" anchor="ctr"/>
+          <a:lstStyle/>
+          <a:p>
+            <a:pPr algn="ctr"/>
+            <a:r>
+              <a:rPr lang="en-US" sz="1200" dirty="0" err="1"/>
+              <a:t>AngbandOS.Core.Interface.IConsole</a:t>
+            </a:r>
+            <a:endParaRPr lang="en-US" sz="1200" dirty="0"/>
+          </a:p>
+          <a:p>
+            <a:pPr algn="ctr"/>
+            <a:r>
+              <a:rPr lang="en-US" sz="700" dirty="0"/>
+              <a:t>This is the interface that needs to be implemented by clients (e.g. </a:t>
+            </a:r>
+            <a:r>
+              <a:rPr lang="en-US" sz="700" dirty="0" err="1"/>
+              <a:t>AngbandOS.Web</a:t>
+            </a:r>
+            <a:r>
+              <a:rPr lang="en-US" sz="700" dirty="0"/>
+              <a:t>) to participate in with the game “core”.</a:t>
+            </a:r>
+          </a:p>
+        </p:txBody>
+      </p:sp>
+      <p:sp>
+        <p:nvSpPr>
+          <p:cNvPr id="30" name="Rectangle 29">
+            <a:extLst>
+              <a:ext uri="{FF2B5EF4-FFF2-40B4-BE49-F238E27FC236}">
+                <a16:creationId xmlns:a16="http://schemas.microsoft.com/office/drawing/2014/main" id="{A7035500-5107-341F-10AD-6490E25B3775}"/>
+              </a:ext>
+            </a:extLst>
+          </p:cNvPr>
+          <p:cNvSpPr/>
+          <p:nvPr/>
+        </p:nvSpPr>
+        <p:spPr>
+          <a:xfrm>
+            <a:off x="6365727" y="2676791"/>
+            <a:ext cx="4139912" cy="390439"/>
+          </a:xfrm>
+          <a:prstGeom prst="rect">
+            <a:avLst/>
+          </a:prstGeom>
+        </p:spPr>
+        <p:style>
+          <a:lnRef idx="2">
+            <a:schemeClr val="accent1">
+              <a:shade val="15000"/>
+            </a:schemeClr>
+          </a:lnRef>
+          <a:fillRef idx="1">
+            <a:schemeClr val="accent1"/>
+          </a:fillRef>
+          <a:effectRef idx="0">
+            <a:schemeClr val="accent1"/>
+          </a:effectRef>
+          <a:fontRef idx="minor">
+            <a:schemeClr val="lt1"/>
+          </a:fontRef>
+        </p:style>
+        <p:txBody>
+          <a:bodyPr rtlCol="0" anchor="ctr"/>
+          <a:lstStyle/>
+          <a:p>
+            <a:pPr algn="ctr"/>
+            <a:r>
+              <a:rPr lang="en-US" sz="1200" dirty="0" err="1"/>
+              <a:t>AngbandOS.Web.SignalRConsole</a:t>
+            </a:r>
+            <a:endParaRPr lang="en-US" sz="1200" dirty="0"/>
+          </a:p>
+          <a:p>
+            <a:pPr algn="ctr"/>
+            <a:r>
+              <a:rPr lang="en-US" sz="700" dirty="0"/>
+              <a:t>This is an object that the </a:t>
+            </a:r>
+            <a:r>
+              <a:rPr lang="en-US" sz="700" dirty="0" err="1"/>
+              <a:t>GameService</a:t>
+            </a:r>
+            <a:r>
+              <a:rPr lang="en-US" sz="700" dirty="0"/>
+              <a:t> creates to run in the background to relay </a:t>
+            </a:r>
+            <a:r>
+              <a:rPr lang="en-US" sz="700" dirty="0" err="1"/>
+              <a:t>IConsole</a:t>
+            </a:r>
+            <a:r>
+              <a:rPr lang="en-US" sz="700" dirty="0"/>
+              <a:t> interface commands from the game “core” to the </a:t>
+            </a:r>
+            <a:r>
+              <a:rPr lang="en-US" sz="700" dirty="0" err="1"/>
+              <a:t>GameHub</a:t>
+            </a:r>
+            <a:r>
+              <a:rPr lang="en-US" sz="700" dirty="0"/>
+              <a:t>.</a:t>
+            </a:r>
+          </a:p>
+        </p:txBody>
+      </p:sp>
+      <p:cxnSp>
+        <p:nvCxnSpPr>
+          <p:cNvPr id="31" name="Straight Arrow Connector 30">
+            <a:extLst>
+              <a:ext uri="{FF2B5EF4-FFF2-40B4-BE49-F238E27FC236}">
+                <a16:creationId xmlns:a16="http://schemas.microsoft.com/office/drawing/2014/main" id="{7144A539-0F02-682B-3969-1B2EF727490F}"/>
+              </a:ext>
+            </a:extLst>
+          </p:cNvPr>
+          <p:cNvCxnSpPr>
+            <a:cxnSpLocks/>
+            <a:stCxn id="28" idx="2"/>
+            <a:endCxn id="29" idx="0"/>
+          </p:cNvCxnSpPr>
+          <p:nvPr/>
+        </p:nvCxnSpPr>
+        <p:spPr>
+          <a:xfrm flipH="1">
+            <a:off x="8435685" y="1790978"/>
             <a:ext cx="1" cy="247687"/>
           </a:xfrm>
           <a:prstGeom prst="straightConnector1">
@@ -4161,23 +5181,23 @@
       </p:cxnSp>
       <p:cxnSp>
         <p:nvCxnSpPr>
-          <p:cNvPr id="16" name="Straight Arrow Connector 15">
-            <a:extLst>
-              <a:ext uri="{FF2B5EF4-FFF2-40B4-BE49-F238E27FC236}">
-                <a16:creationId xmlns:a16="http://schemas.microsoft.com/office/drawing/2014/main" id="{09139845-CBA0-8117-CA77-8764D191CCB4}"/>
+          <p:cNvPr id="32" name="Straight Arrow Connector 31">
+            <a:extLst>
+              <a:ext uri="{FF2B5EF4-FFF2-40B4-BE49-F238E27FC236}">
+                <a16:creationId xmlns:a16="http://schemas.microsoft.com/office/drawing/2014/main" id="{C8D79935-A19D-1EE1-6472-C6B93366D254}"/>
               </a:ext>
             </a:extLst>
           </p:cNvPr>
           <p:cNvCxnSpPr>
             <a:cxnSpLocks/>
-            <a:stCxn id="5" idx="2"/>
-            <a:endCxn id="7" idx="0"/>
+            <a:stCxn id="29" idx="2"/>
+            <a:endCxn id="30" idx="0"/>
           </p:cNvCxnSpPr>
           <p:nvPr/>
         </p:nvCxnSpPr>
         <p:spPr>
           <a:xfrm flipH="1">
-            <a:off x="6095997" y="2422501"/>
+            <a:off x="8435683" y="2429104"/>
             <a:ext cx="2" cy="247687"/>
           </a:xfrm>
           <a:prstGeom prst="straightConnector1">
@@ -4204,196 +5224,22 @@
       </p:cxnSp>
       <p:cxnSp>
         <p:nvCxnSpPr>
-          <p:cNvPr id="18" name="Straight Arrow Connector 17">
-            <a:extLst>
-              <a:ext uri="{FF2B5EF4-FFF2-40B4-BE49-F238E27FC236}">
-                <a16:creationId xmlns:a16="http://schemas.microsoft.com/office/drawing/2014/main" id="{6D3782EE-8A3E-EDB4-9F34-CA9C71943B53}"/>
+          <p:cNvPr id="35" name="Straight Arrow Connector 34">
+            <a:extLst>
+              <a:ext uri="{FF2B5EF4-FFF2-40B4-BE49-F238E27FC236}">
+                <a16:creationId xmlns:a16="http://schemas.microsoft.com/office/drawing/2014/main" id="{C126DB57-E201-CEE9-0A7C-4EDF448659B9}"/>
               </a:ext>
             </a:extLst>
           </p:cNvPr>
           <p:cNvCxnSpPr>
-            <a:cxnSpLocks/>
-            <a:stCxn id="7" idx="2"/>
-            <a:endCxn id="6" idx="0"/>
-          </p:cNvCxnSpPr>
-          <p:nvPr/>
-        </p:nvCxnSpPr>
-        <p:spPr>
-          <a:xfrm>
-            <a:off x="6095997" y="3060627"/>
-            <a:ext cx="1" cy="248775"/>
-          </a:xfrm>
-          <a:prstGeom prst="straightConnector1">
-            <a:avLst/>
-          </a:prstGeom>
-          <a:ln>
-            <a:tailEnd type="triangle"/>
-          </a:ln>
-        </p:spPr>
-        <p:style>
-          <a:lnRef idx="1">
-            <a:schemeClr val="accent1"/>
-          </a:lnRef>
-          <a:fillRef idx="0">
-            <a:schemeClr val="accent1"/>
-          </a:fillRef>
-          <a:effectRef idx="0">
-            <a:schemeClr val="accent1"/>
-          </a:effectRef>
-          <a:fontRef idx="minor">
-            <a:schemeClr val="tx1"/>
-          </a:fontRef>
-        </p:style>
-      </p:cxnSp>
-      <p:cxnSp>
-        <p:nvCxnSpPr>
-          <p:cNvPr id="20" name="Straight Arrow Connector 19">
-            <a:extLst>
-              <a:ext uri="{FF2B5EF4-FFF2-40B4-BE49-F238E27FC236}">
-                <a16:creationId xmlns:a16="http://schemas.microsoft.com/office/drawing/2014/main" id="{DDD01F96-6F22-9191-0B13-D5D5BBE3F3BD}"/>
-              </a:ext>
-            </a:extLst>
-          </p:cNvPr>
-          <p:cNvCxnSpPr>
-            <a:cxnSpLocks/>
-            <a:stCxn id="6" idx="2"/>
-            <a:endCxn id="8" idx="0"/>
+            <a:stCxn id="30" idx="2"/>
           </p:cNvCxnSpPr>
           <p:nvPr/>
         </p:nvCxnSpPr>
         <p:spPr>
           <a:xfrm flipH="1">
-            <a:off x="6095997" y="3699841"/>
-            <a:ext cx="1" cy="248775"/>
-          </a:xfrm>
-          <a:prstGeom prst="straightConnector1">
-            <a:avLst/>
-          </a:prstGeom>
-          <a:ln>
-            <a:tailEnd type="triangle"/>
-          </a:ln>
-        </p:spPr>
-        <p:style>
-          <a:lnRef idx="1">
-            <a:schemeClr val="accent1"/>
-          </a:lnRef>
-          <a:fillRef idx="0">
-            <a:schemeClr val="accent1"/>
-          </a:fillRef>
-          <a:effectRef idx="0">
-            <a:schemeClr val="accent1"/>
-          </a:effectRef>
-          <a:fontRef idx="minor">
-            <a:schemeClr val="tx1"/>
-          </a:fontRef>
-        </p:style>
-      </p:cxnSp>
-      <p:cxnSp>
-        <p:nvCxnSpPr>
-          <p:cNvPr id="22" name="Straight Arrow Connector 21">
-            <a:extLst>
-              <a:ext uri="{FF2B5EF4-FFF2-40B4-BE49-F238E27FC236}">
-                <a16:creationId xmlns:a16="http://schemas.microsoft.com/office/drawing/2014/main" id="{C4E392C9-13B0-F3F7-A581-7D0A42B01EE2}"/>
-              </a:ext>
-            </a:extLst>
-          </p:cNvPr>
-          <p:cNvCxnSpPr>
-            <a:cxnSpLocks/>
-            <a:stCxn id="8" idx="2"/>
-            <a:endCxn id="9" idx="0"/>
-          </p:cNvCxnSpPr>
-          <p:nvPr/>
-        </p:nvCxnSpPr>
-        <p:spPr>
-          <a:xfrm>
-            <a:off x="6095997" y="4339055"/>
-            <a:ext cx="0" cy="248775"/>
-          </a:xfrm>
-          <a:prstGeom prst="straightConnector1">
-            <a:avLst/>
-          </a:prstGeom>
-          <a:ln>
-            <a:tailEnd type="triangle"/>
-          </a:ln>
-        </p:spPr>
-        <p:style>
-          <a:lnRef idx="1">
-            <a:schemeClr val="accent1"/>
-          </a:lnRef>
-          <a:fillRef idx="0">
-            <a:schemeClr val="accent1"/>
-          </a:fillRef>
-          <a:effectRef idx="0">
-            <a:schemeClr val="accent1"/>
-          </a:effectRef>
-          <a:fontRef idx="minor">
-            <a:schemeClr val="tx1"/>
-          </a:fontRef>
-        </p:style>
-      </p:cxnSp>
-      <p:cxnSp>
-        <p:nvCxnSpPr>
-          <p:cNvPr id="24" name="Straight Arrow Connector 23">
-            <a:extLst>
-              <a:ext uri="{FF2B5EF4-FFF2-40B4-BE49-F238E27FC236}">
-                <a16:creationId xmlns:a16="http://schemas.microsoft.com/office/drawing/2014/main" id="{06A53A37-00F2-6F4B-C9E9-6F406A44949E}"/>
-              </a:ext>
-            </a:extLst>
-          </p:cNvPr>
-          <p:cNvCxnSpPr>
-            <a:cxnSpLocks/>
-            <a:stCxn id="9" idx="2"/>
-            <a:endCxn id="10" idx="0"/>
-          </p:cNvCxnSpPr>
-          <p:nvPr/>
-        </p:nvCxnSpPr>
-        <p:spPr>
-          <a:xfrm>
-            <a:off x="6095997" y="4978269"/>
-            <a:ext cx="0" cy="250593"/>
-          </a:xfrm>
-          <a:prstGeom prst="straightConnector1">
-            <a:avLst/>
-          </a:prstGeom>
-          <a:ln>
-            <a:tailEnd type="triangle"/>
-          </a:ln>
-        </p:spPr>
-        <p:style>
-          <a:lnRef idx="1">
-            <a:schemeClr val="accent1"/>
-          </a:lnRef>
-          <a:fillRef idx="0">
-            <a:schemeClr val="accent1"/>
-          </a:fillRef>
-          <a:effectRef idx="0">
-            <a:schemeClr val="accent1"/>
-          </a:effectRef>
-          <a:fontRef idx="minor">
-            <a:schemeClr val="tx1"/>
-          </a:fontRef>
-        </p:style>
-      </p:cxnSp>
-      <p:cxnSp>
-        <p:nvCxnSpPr>
-          <p:cNvPr id="26" name="Straight Arrow Connector 25">
-            <a:extLst>
-              <a:ext uri="{FF2B5EF4-FFF2-40B4-BE49-F238E27FC236}">
-                <a16:creationId xmlns:a16="http://schemas.microsoft.com/office/drawing/2014/main" id="{5A387D98-2263-5C90-86AD-6B3727A8CEAC}"/>
-              </a:ext>
-            </a:extLst>
-          </p:cNvPr>
-          <p:cNvCxnSpPr>
-            <a:cxnSpLocks/>
-            <a:stCxn id="10" idx="2"/>
-            <a:endCxn id="11" idx="0"/>
-          </p:cNvCxnSpPr>
-          <p:nvPr/>
-        </p:nvCxnSpPr>
-        <p:spPr>
-          <a:xfrm>
-            <a:off x="6095997" y="5619302"/>
-            <a:ext cx="0" cy="253433"/>
+            <a:off x="5971922" y="3067230"/>
+            <a:ext cx="2463761" cy="242171"/>
           </a:xfrm>
           <a:prstGeom prst="straightConnector1">
             <a:avLst/>

</xml_diff>

<commit_message>
The GameService, SignalRConsole and GameHub objects now have separate paths for playing an existing game and playing a new game.
</commit_message>
<xml_diff>
--- a/Documents/AngbandOS.Web Topology.pptx
+++ b/Documents/AngbandOS.Web Topology.pptx
@@ -7,6 +7,7 @@
   <p:sldIdLst>
     <p:sldId id="256" r:id="rId2"/>
     <p:sldId id="258" r:id="rId3"/>
+    <p:sldId id="259" r:id="rId4"/>
   </p:sldIdLst>
   <p:sldSz cx="12192000" cy="6858000"/>
   <p:notesSz cx="6858000" cy="9144000"/>
@@ -116,7 +117,7 @@
 <file path=ppt/revisionInfo.xml><?xml version="1.0" encoding="utf-8"?>
 <p1510:revInfo xmlns:a="http://schemas.openxmlformats.org/drawingml/2006/main" xmlns:r="http://schemas.openxmlformats.org/officeDocument/2006/relationships" xmlns:p1510="http://schemas.microsoft.com/office/powerpoint/2015/10/main">
   <p1510:revLst>
-    <p1510:client id="{F93D44ED-375D-4FA9-90AA-824A0B780C8F}" v="73" dt="2024-10-08T21:19:22.841"/>
+    <p1510:client id="{F93D44ED-375D-4FA9-90AA-824A0B780C8F}" v="96" dt="2024-10-11T15:04:43.468"/>
   </p1510:revLst>
 </p1510:revInfo>
 </file>
@@ -126,7 +127,7 @@
   <pc:docChgLst>
     <pc:chgData name="Marc Johnston" userId="4bd435294172a9e0" providerId="LiveId" clId="{F93D44ED-375D-4FA9-90AA-824A0B780C8F}"/>
     <pc:docChg chg="undo custSel addSld delSld modSld">
-      <pc:chgData name="Marc Johnston" userId="4bd435294172a9e0" providerId="LiveId" clId="{F93D44ED-375D-4FA9-90AA-824A0B780C8F}" dt="2024-10-08T21:28:12.017" v="1759" actId="14100"/>
+      <pc:chgData name="Marc Johnston" userId="4bd435294172a9e0" providerId="LiveId" clId="{F93D44ED-375D-4FA9-90AA-824A0B780C8F}" dt="2024-10-11T15:05:45.724" v="2387" actId="20577"/>
       <pc:docMkLst>
         <pc:docMk/>
       </pc:docMkLst>
@@ -410,7 +411,7 @@
         </pc:cxnChg>
       </pc:sldChg>
       <pc:sldChg chg="addSp delSp modSp new mod">
-        <pc:chgData name="Marc Johnston" userId="4bd435294172a9e0" providerId="LiveId" clId="{F93D44ED-375D-4FA9-90AA-824A0B780C8F}" dt="2024-10-08T21:28:12.017" v="1759" actId="14100"/>
+        <pc:chgData name="Marc Johnston" userId="4bd435294172a9e0" providerId="LiveId" clId="{F93D44ED-375D-4FA9-90AA-824A0B780C8F}" dt="2024-10-11T14:50:52.157" v="1792" actId="21"/>
         <pc:sldMkLst>
           <pc:docMk/>
           <pc:sldMk cId="3896090519" sldId="258"/>
@@ -791,8 +792,8 @@
             <ac:spMk id="58" creationId="{38C7558C-8069-6938-3B1C-7B2700714817}"/>
           </ac:spMkLst>
         </pc:spChg>
-        <pc:spChg chg="mod topLvl">
-          <ac:chgData name="Marc Johnston" userId="4bd435294172a9e0" providerId="LiveId" clId="{F93D44ED-375D-4FA9-90AA-824A0B780C8F}" dt="2024-10-08T21:13:52.593" v="1653" actId="1038"/>
+        <pc:spChg chg="add del mod topLvl">
+          <ac:chgData name="Marc Johnston" userId="4bd435294172a9e0" providerId="LiveId" clId="{F93D44ED-375D-4FA9-90AA-824A0B780C8F}" dt="2024-10-11T14:50:52.157" v="1792" actId="21"/>
           <ac:spMkLst>
             <pc:docMk/>
             <pc:sldMk cId="3896090519" sldId="258"/>
@@ -1213,6 +1214,229 @@
             <pc:docMk/>
             <pc:sldMk cId="3896090519" sldId="258"/>
             <ac:cxnSpMk id="128" creationId="{9B13B2FD-174B-3566-97A1-298007AD1FF9}"/>
+          </ac:cxnSpMkLst>
+        </pc:cxnChg>
+      </pc:sldChg>
+      <pc:sldChg chg="addSp delSp modSp new mod">
+        <pc:chgData name="Marc Johnston" userId="4bd435294172a9e0" providerId="LiveId" clId="{F93D44ED-375D-4FA9-90AA-824A0B780C8F}" dt="2024-10-11T15:05:45.724" v="2387" actId="20577"/>
+        <pc:sldMkLst>
+          <pc:docMk/>
+          <pc:sldMk cId="724311830" sldId="259"/>
+        </pc:sldMkLst>
+        <pc:spChg chg="mod">
+          <ac:chgData name="Marc Johnston" userId="4bd435294172a9e0" providerId="LiveId" clId="{F93D44ED-375D-4FA9-90AA-824A0B780C8F}" dt="2024-10-11T15:05:45.724" v="2387" actId="20577"/>
+          <ac:spMkLst>
+            <pc:docMk/>
+            <pc:sldMk cId="724311830" sldId="259"/>
+            <ac:spMk id="2" creationId="{A05D08D7-ED52-D258-28EB-5E7B10684133}"/>
+          </ac:spMkLst>
+        </pc:spChg>
+        <pc:spChg chg="add mod">
+          <ac:chgData name="Marc Johnston" userId="4bd435294172a9e0" providerId="LiveId" clId="{F93D44ED-375D-4FA9-90AA-824A0B780C8F}" dt="2024-10-11T15:05:30.965" v="2375" actId="1076"/>
+          <ac:spMkLst>
+            <pc:docMk/>
+            <pc:sldMk cId="724311830" sldId="259"/>
+            <ac:spMk id="3" creationId="{A5FE8195-4316-B378-0D49-1F3AD65F3AE1}"/>
+          </ac:spMkLst>
+        </pc:spChg>
+        <pc:spChg chg="add mod">
+          <ac:chgData name="Marc Johnston" userId="4bd435294172a9e0" providerId="LiveId" clId="{F93D44ED-375D-4FA9-90AA-824A0B780C8F}" dt="2024-10-11T15:05:30.965" v="2375" actId="1076"/>
+          <ac:spMkLst>
+            <pc:docMk/>
+            <pc:sldMk cId="724311830" sldId="259"/>
+            <ac:spMk id="4" creationId="{5895AB41-3B1C-BD8F-A481-A5ED4D002BC2}"/>
+          </ac:spMkLst>
+        </pc:spChg>
+        <pc:spChg chg="add del mod">
+          <ac:chgData name="Marc Johnston" userId="4bd435294172a9e0" providerId="LiveId" clId="{F93D44ED-375D-4FA9-90AA-824A0B780C8F}" dt="2024-10-11T14:51:11.405" v="1796" actId="478"/>
+          <ac:spMkLst>
+            <pc:docMk/>
+            <pc:sldMk cId="724311830" sldId="259"/>
+            <ac:spMk id="5" creationId="{DEEADDEA-74DC-3C61-760B-84FC72893BD5}"/>
+          </ac:spMkLst>
+        </pc:spChg>
+        <pc:spChg chg="add mod">
+          <ac:chgData name="Marc Johnston" userId="4bd435294172a9e0" providerId="LiveId" clId="{F93D44ED-375D-4FA9-90AA-824A0B780C8F}" dt="2024-10-11T15:05:30.965" v="2375" actId="1076"/>
+          <ac:spMkLst>
+            <pc:docMk/>
+            <pc:sldMk cId="724311830" sldId="259"/>
+            <ac:spMk id="6" creationId="{C172A6F9-8855-1645-9903-61A2569960EC}"/>
+          </ac:spMkLst>
+        </pc:spChg>
+        <pc:spChg chg="add mod">
+          <ac:chgData name="Marc Johnston" userId="4bd435294172a9e0" providerId="LiveId" clId="{F93D44ED-375D-4FA9-90AA-824A0B780C8F}" dt="2024-10-11T15:05:30.965" v="2375" actId="1076"/>
+          <ac:spMkLst>
+            <pc:docMk/>
+            <pc:sldMk cId="724311830" sldId="259"/>
+            <ac:spMk id="7" creationId="{0F136BFE-876A-306D-01EF-A58949E1CCFE}"/>
+          </ac:spMkLst>
+        </pc:spChg>
+        <pc:spChg chg="add mod">
+          <ac:chgData name="Marc Johnston" userId="4bd435294172a9e0" providerId="LiveId" clId="{F93D44ED-375D-4FA9-90AA-824A0B780C8F}" dt="2024-10-11T15:05:30.965" v="2375" actId="1076"/>
+          <ac:spMkLst>
+            <pc:docMk/>
+            <pc:sldMk cId="724311830" sldId="259"/>
+            <ac:spMk id="8" creationId="{CE9D2222-B765-8243-F490-351231E50B29}"/>
+          </ac:spMkLst>
+        </pc:spChg>
+        <pc:spChg chg="add mod">
+          <ac:chgData name="Marc Johnston" userId="4bd435294172a9e0" providerId="LiveId" clId="{F93D44ED-375D-4FA9-90AA-824A0B780C8F}" dt="2024-10-11T15:05:30.965" v="2375" actId="1076"/>
+          <ac:spMkLst>
+            <pc:docMk/>
+            <pc:sldMk cId="724311830" sldId="259"/>
+            <ac:spMk id="9" creationId="{F20F36D2-6A7F-4940-FA54-D9F72BD235FD}"/>
+          </ac:spMkLst>
+        </pc:spChg>
+        <pc:spChg chg="add mod">
+          <ac:chgData name="Marc Johnston" userId="4bd435294172a9e0" providerId="LiveId" clId="{F93D44ED-375D-4FA9-90AA-824A0B780C8F}" dt="2024-10-11T15:05:30.965" v="2375" actId="1076"/>
+          <ac:spMkLst>
+            <pc:docMk/>
+            <pc:sldMk cId="724311830" sldId="259"/>
+            <ac:spMk id="10" creationId="{5681CE96-4C6A-3238-4AAA-63384767AD45}"/>
+          </ac:spMkLst>
+        </pc:spChg>
+        <pc:spChg chg="add mod">
+          <ac:chgData name="Marc Johnston" userId="4bd435294172a9e0" providerId="LiveId" clId="{F93D44ED-375D-4FA9-90AA-824A0B780C8F}" dt="2024-10-11T14:54:50.403" v="1853"/>
+          <ac:spMkLst>
+            <pc:docMk/>
+            <pc:sldMk cId="724311830" sldId="259"/>
+            <ac:spMk id="11" creationId="{EF570FD0-517F-5AA8-7AE4-4AE26CAAAD2B}"/>
+          </ac:spMkLst>
+        </pc:spChg>
+        <pc:spChg chg="mod topLvl">
+          <ac:chgData name="Marc Johnston" userId="4bd435294172a9e0" providerId="LiveId" clId="{F93D44ED-375D-4FA9-90AA-824A0B780C8F}" dt="2024-10-11T15:05:30.965" v="2375" actId="1076"/>
+          <ac:spMkLst>
+            <pc:docMk/>
+            <pc:sldMk cId="724311830" sldId="259"/>
+            <ac:spMk id="13" creationId="{6714259B-86E2-B7F7-E207-FA114F60CB62}"/>
+          </ac:spMkLst>
+        </pc:spChg>
+        <pc:spChg chg="mod topLvl">
+          <ac:chgData name="Marc Johnston" userId="4bd435294172a9e0" providerId="LiveId" clId="{F93D44ED-375D-4FA9-90AA-824A0B780C8F}" dt="2024-10-11T15:05:30.965" v="2375" actId="1076"/>
+          <ac:spMkLst>
+            <pc:docMk/>
+            <pc:sldMk cId="724311830" sldId="259"/>
+            <ac:spMk id="14" creationId="{27A162AF-228C-B392-524F-CED1BA08F738}"/>
+          </ac:spMkLst>
+        </pc:spChg>
+        <pc:spChg chg="add mod">
+          <ac:chgData name="Marc Johnston" userId="4bd435294172a9e0" providerId="LiveId" clId="{F93D44ED-375D-4FA9-90AA-824A0B780C8F}" dt="2024-10-11T15:05:30.965" v="2375" actId="1076"/>
+          <ac:spMkLst>
+            <pc:docMk/>
+            <pc:sldMk cId="724311830" sldId="259"/>
+            <ac:spMk id="17" creationId="{373C7360-A3B5-9A60-924D-D8B14E91066E}"/>
+          </ac:spMkLst>
+        </pc:spChg>
+        <pc:spChg chg="add mod">
+          <ac:chgData name="Marc Johnston" userId="4bd435294172a9e0" providerId="LiveId" clId="{F93D44ED-375D-4FA9-90AA-824A0B780C8F}" dt="2024-10-11T15:05:30.965" v="2375" actId="1076"/>
+          <ac:spMkLst>
+            <pc:docMk/>
+            <pc:sldMk cId="724311830" sldId="259"/>
+            <ac:spMk id="18" creationId="{1208D908-E8AB-BFA4-3327-D95699E02B35}"/>
+          </ac:spMkLst>
+        </pc:spChg>
+        <pc:spChg chg="add mod">
+          <ac:chgData name="Marc Johnston" userId="4bd435294172a9e0" providerId="LiveId" clId="{F93D44ED-375D-4FA9-90AA-824A0B780C8F}" dt="2024-10-11T15:05:30.965" v="2375" actId="1076"/>
+          <ac:spMkLst>
+            <pc:docMk/>
+            <pc:sldMk cId="724311830" sldId="259"/>
+            <ac:spMk id="19" creationId="{9B59292E-6EDA-E378-D6C6-01DC7EB2B3F2}"/>
+          </ac:spMkLst>
+        </pc:spChg>
+        <pc:spChg chg="add mod">
+          <ac:chgData name="Marc Johnston" userId="4bd435294172a9e0" providerId="LiveId" clId="{F93D44ED-375D-4FA9-90AA-824A0B780C8F}" dt="2024-10-11T15:05:30.965" v="2375" actId="1076"/>
+          <ac:spMkLst>
+            <pc:docMk/>
+            <pc:sldMk cId="724311830" sldId="259"/>
+            <ac:spMk id="20" creationId="{B16225C5-80B6-190E-BE05-A17EF04CB78B}"/>
+          </ac:spMkLst>
+        </pc:spChg>
+        <pc:spChg chg="add mod">
+          <ac:chgData name="Marc Johnston" userId="4bd435294172a9e0" providerId="LiveId" clId="{F93D44ED-375D-4FA9-90AA-824A0B780C8F}" dt="2024-10-11T15:05:30.965" v="2375" actId="1076"/>
+          <ac:spMkLst>
+            <pc:docMk/>
+            <pc:sldMk cId="724311830" sldId="259"/>
+            <ac:spMk id="24" creationId="{622DDF5B-C55C-EADD-96BB-896A9244B391}"/>
+          </ac:spMkLst>
+        </pc:spChg>
+        <pc:spChg chg="add mod">
+          <ac:chgData name="Marc Johnston" userId="4bd435294172a9e0" providerId="LiveId" clId="{F93D44ED-375D-4FA9-90AA-824A0B780C8F}" dt="2024-10-11T15:05:30.965" v="2375" actId="1076"/>
+          <ac:spMkLst>
+            <pc:docMk/>
+            <pc:sldMk cId="724311830" sldId="259"/>
+            <ac:spMk id="30" creationId="{C4D62BA6-F6D8-15F6-1110-48E45E1C380F}"/>
+          </ac:spMkLst>
+        </pc:spChg>
+        <pc:spChg chg="add mod">
+          <ac:chgData name="Marc Johnston" userId="4bd435294172a9e0" providerId="LiveId" clId="{F93D44ED-375D-4FA9-90AA-824A0B780C8F}" dt="2024-10-11T15:03:54.113" v="2283"/>
+          <ac:spMkLst>
+            <pc:docMk/>
+            <pc:sldMk cId="724311830" sldId="259"/>
+            <ac:spMk id="31" creationId="{5E63A056-FDBA-73F4-683E-C4C6F7806543}"/>
+          </ac:spMkLst>
+        </pc:spChg>
+        <pc:spChg chg="add mod">
+          <ac:chgData name="Marc Johnston" userId="4bd435294172a9e0" providerId="LiveId" clId="{F93D44ED-375D-4FA9-90AA-824A0B780C8F}" dt="2024-10-11T15:05:30.965" v="2375" actId="1076"/>
+          <ac:spMkLst>
+            <pc:docMk/>
+            <pc:sldMk cId="724311830" sldId="259"/>
+            <ac:spMk id="32" creationId="{2BC8FD4E-0174-C6A6-97BE-DB5A3FBF5E23}"/>
+          </ac:spMkLst>
+        </pc:spChg>
+        <pc:spChg chg="add del mod">
+          <ac:chgData name="Marc Johnston" userId="4bd435294172a9e0" providerId="LiveId" clId="{F93D44ED-375D-4FA9-90AA-824A0B780C8F}" dt="2024-10-11T15:04:40.302" v="2302" actId="478"/>
+          <ac:spMkLst>
+            <pc:docMk/>
+            <pc:sldMk cId="724311830" sldId="259"/>
+            <ac:spMk id="36" creationId="{CDC9AC5B-9C94-C999-BCBF-E8AC2E99EACD}"/>
+          </ac:spMkLst>
+        </pc:spChg>
+        <pc:spChg chg="add mod">
+          <ac:chgData name="Marc Johnston" userId="4bd435294172a9e0" providerId="LiveId" clId="{F93D44ED-375D-4FA9-90AA-824A0B780C8F}" dt="2024-10-11T15:05:30.965" v="2375" actId="1076"/>
+          <ac:spMkLst>
+            <pc:docMk/>
+            <pc:sldMk cId="724311830" sldId="259"/>
+            <ac:spMk id="37" creationId="{52240882-EB3A-6589-E612-18B22B3E7F4B}"/>
+          </ac:spMkLst>
+        </pc:spChg>
+        <pc:grpChg chg="add del mod">
+          <ac:chgData name="Marc Johnston" userId="4bd435294172a9e0" providerId="LiveId" clId="{F93D44ED-375D-4FA9-90AA-824A0B780C8F}" dt="2024-10-11T14:55:30.056" v="1858" actId="165"/>
+          <ac:grpSpMkLst>
+            <pc:docMk/>
+            <pc:sldMk cId="724311830" sldId="259"/>
+            <ac:grpSpMk id="12" creationId="{EF525732-EC37-D073-24FE-17DEF273517A}"/>
+          </ac:grpSpMkLst>
+        </pc:grpChg>
+        <pc:cxnChg chg="add mod">
+          <ac:chgData name="Marc Johnston" userId="4bd435294172a9e0" providerId="LiveId" clId="{F93D44ED-375D-4FA9-90AA-824A0B780C8F}" dt="2024-10-11T15:05:30.965" v="2375" actId="1076"/>
+          <ac:cxnSpMkLst>
+            <pc:docMk/>
+            <pc:sldMk cId="724311830" sldId="259"/>
+            <ac:cxnSpMk id="16" creationId="{04F5A2D8-9A13-26B4-9D4F-2B5A1A9C20BF}"/>
+          </ac:cxnSpMkLst>
+        </pc:cxnChg>
+        <pc:cxnChg chg="add mod">
+          <ac:chgData name="Marc Johnston" userId="4bd435294172a9e0" providerId="LiveId" clId="{F93D44ED-375D-4FA9-90AA-824A0B780C8F}" dt="2024-10-11T15:05:30.965" v="2375" actId="1076"/>
+          <ac:cxnSpMkLst>
+            <pc:docMk/>
+            <pc:sldMk cId="724311830" sldId="259"/>
+            <ac:cxnSpMk id="22" creationId="{22B2166A-FB96-5490-1C22-D85EDA1AF1D0}"/>
+          </ac:cxnSpMkLst>
+        </pc:cxnChg>
+        <pc:cxnChg chg="add mod">
+          <ac:chgData name="Marc Johnston" userId="4bd435294172a9e0" providerId="LiveId" clId="{F93D44ED-375D-4FA9-90AA-824A0B780C8F}" dt="2024-10-11T15:05:30.965" v="2375" actId="1076"/>
+          <ac:cxnSpMkLst>
+            <pc:docMk/>
+            <pc:sldMk cId="724311830" sldId="259"/>
+            <ac:cxnSpMk id="27" creationId="{CC16B335-165E-2652-7A9B-249FB37B0B40}"/>
+          </ac:cxnSpMkLst>
+        </pc:cxnChg>
+        <pc:cxnChg chg="add mod">
+          <ac:chgData name="Marc Johnston" userId="4bd435294172a9e0" providerId="LiveId" clId="{F93D44ED-375D-4FA9-90AA-824A0B780C8F}" dt="2024-10-11T15:05:30.965" v="2375" actId="1076"/>
+          <ac:cxnSpMkLst>
+            <pc:docMk/>
+            <pc:sldMk cId="724311830" sldId="259"/>
+            <ac:cxnSpMk id="35" creationId="{02BF26EC-F4CC-6675-606A-1ABCEBEB9B9D}"/>
           </ac:cxnSpMkLst>
         </pc:cxnChg>
       </pc:sldChg>
@@ -1368,7 +1592,7 @@
           <a:p>
             <a:fld id="{9DDBC151-5FFB-4DB1-ABDD-62D5F90FDE0C}" type="datetimeFigureOut">
               <a:rPr lang="en-US" smtClean="0"/>
-              <a:t>10/8/2024</a:t>
+              <a:t>10/9/2024</a:t>
             </a:fld>
             <a:endParaRPr lang="en-US"/>
           </a:p>
@@ -1566,7 +1790,7 @@
           <a:p>
             <a:fld id="{9DDBC151-5FFB-4DB1-ABDD-62D5F90FDE0C}" type="datetimeFigureOut">
               <a:rPr lang="en-US" smtClean="0"/>
-              <a:t>10/8/2024</a:t>
+              <a:t>10/9/2024</a:t>
             </a:fld>
             <a:endParaRPr lang="en-US"/>
           </a:p>
@@ -1774,7 +1998,7 @@
           <a:p>
             <a:fld id="{9DDBC151-5FFB-4DB1-ABDD-62D5F90FDE0C}" type="datetimeFigureOut">
               <a:rPr lang="en-US" smtClean="0"/>
-              <a:t>10/8/2024</a:t>
+              <a:t>10/9/2024</a:t>
             </a:fld>
             <a:endParaRPr lang="en-US"/>
           </a:p>
@@ -1972,7 +2196,7 @@
           <a:p>
             <a:fld id="{9DDBC151-5FFB-4DB1-ABDD-62D5F90FDE0C}" type="datetimeFigureOut">
               <a:rPr lang="en-US" smtClean="0"/>
-              <a:t>10/8/2024</a:t>
+              <a:t>10/9/2024</a:t>
             </a:fld>
             <a:endParaRPr lang="en-US"/>
           </a:p>
@@ -2247,7 +2471,7 @@
           <a:p>
             <a:fld id="{9DDBC151-5FFB-4DB1-ABDD-62D5F90FDE0C}" type="datetimeFigureOut">
               <a:rPr lang="en-US" smtClean="0"/>
-              <a:t>10/8/2024</a:t>
+              <a:t>10/9/2024</a:t>
             </a:fld>
             <a:endParaRPr lang="en-US"/>
           </a:p>
@@ -2512,7 +2736,7 @@
           <a:p>
             <a:fld id="{9DDBC151-5FFB-4DB1-ABDD-62D5F90FDE0C}" type="datetimeFigureOut">
               <a:rPr lang="en-US" smtClean="0"/>
-              <a:t>10/8/2024</a:t>
+              <a:t>10/9/2024</a:t>
             </a:fld>
             <a:endParaRPr lang="en-US"/>
           </a:p>
@@ -2924,7 +3148,7 @@
           <a:p>
             <a:fld id="{9DDBC151-5FFB-4DB1-ABDD-62D5F90FDE0C}" type="datetimeFigureOut">
               <a:rPr lang="en-US" smtClean="0"/>
-              <a:t>10/8/2024</a:t>
+              <a:t>10/9/2024</a:t>
             </a:fld>
             <a:endParaRPr lang="en-US"/>
           </a:p>
@@ -3065,7 +3289,7 @@
           <a:p>
             <a:fld id="{9DDBC151-5FFB-4DB1-ABDD-62D5F90FDE0C}" type="datetimeFigureOut">
               <a:rPr lang="en-US" smtClean="0"/>
-              <a:t>10/8/2024</a:t>
+              <a:t>10/9/2024</a:t>
             </a:fld>
             <a:endParaRPr lang="en-US"/>
           </a:p>
@@ -3178,7 +3402,7 @@
           <a:p>
             <a:fld id="{9DDBC151-5FFB-4DB1-ABDD-62D5F90FDE0C}" type="datetimeFigureOut">
               <a:rPr lang="en-US" smtClean="0"/>
-              <a:t>10/8/2024</a:t>
+              <a:t>10/9/2024</a:t>
             </a:fld>
             <a:endParaRPr lang="en-US"/>
           </a:p>
@@ -3489,7 +3713,7 @@
           <a:p>
             <a:fld id="{9DDBC151-5FFB-4DB1-ABDD-62D5F90FDE0C}" type="datetimeFigureOut">
               <a:rPr lang="en-US" smtClean="0"/>
-              <a:t>10/8/2024</a:t>
+              <a:t>10/9/2024</a:t>
             </a:fld>
             <a:endParaRPr lang="en-US"/>
           </a:p>
@@ -3777,7 +4001,7 @@
           <a:p>
             <a:fld id="{9DDBC151-5FFB-4DB1-ABDD-62D5F90FDE0C}" type="datetimeFigureOut">
               <a:rPr lang="en-US" smtClean="0"/>
-              <a:t>10/8/2024</a:t>
+              <a:t>10/9/2024</a:t>
             </a:fld>
             <a:endParaRPr lang="en-US"/>
           </a:p>
@@ -4018,7 +4242,7 @@
           <a:p>
             <a:fld id="{9DDBC151-5FFB-4DB1-ABDD-62D5F90FDE0C}" type="datetimeFigureOut">
               <a:rPr lang="en-US" smtClean="0"/>
-              <a:t>10/8/2024</a:t>
+              <a:t>10/9/2024</a:t>
             </a:fld>
             <a:endParaRPr lang="en-US"/>
           </a:p>
@@ -7807,6 +8031,1305 @@
 </p:sld>
 </file>
 
+<file path=ppt/slides/slide3.xml><?xml version="1.0" encoding="utf-8"?>
+<p:sld xmlns:a="http://schemas.openxmlformats.org/drawingml/2006/main" xmlns:r="http://schemas.openxmlformats.org/officeDocument/2006/relationships" xmlns:p="http://schemas.openxmlformats.org/presentationml/2006/main">
+  <p:cSld>
+    <p:spTree>
+      <p:nvGrpSpPr>
+        <p:cNvPr id="1" name=""/>
+        <p:cNvGrpSpPr/>
+        <p:nvPr/>
+      </p:nvGrpSpPr>
+      <p:grpSpPr>
+        <a:xfrm>
+          <a:off x="0" y="0"/>
+          <a:ext cx="0" cy="0"/>
+          <a:chOff x="0" y="0"/>
+          <a:chExt cx="0" cy="0"/>
+        </a:xfrm>
+      </p:grpSpPr>
+      <p:sp>
+        <p:nvSpPr>
+          <p:cNvPr id="2" name="Title 1">
+            <a:extLst>
+              <a:ext uri="{FF2B5EF4-FFF2-40B4-BE49-F238E27FC236}">
+                <a16:creationId xmlns:a16="http://schemas.microsoft.com/office/drawing/2014/main" id="{A05D08D7-ED52-D258-28EB-5E7B10684133}"/>
+              </a:ext>
+            </a:extLst>
+          </p:cNvPr>
+          <p:cNvSpPr>
+            <a:spLocks noGrp="1"/>
+          </p:cNvSpPr>
+          <p:nvPr>
+            <p:ph type="title"/>
+          </p:nvPr>
+        </p:nvSpPr>
+        <p:spPr>
+          <a:xfrm>
+            <a:off x="838200" y="365125"/>
+            <a:ext cx="10515600" cy="533091"/>
+          </a:xfrm>
+        </p:spPr>
+        <p:txBody>
+          <a:bodyPr>
+            <a:normAutofit fontScale="90000"/>
+          </a:bodyPr>
+          <a:lstStyle/>
+          <a:p>
+            <a:pPr algn="ctr"/>
+            <a:r>
+              <a:rPr lang="en-US" dirty="0"/>
+              <a:t>Web User Initiate </a:t>
+            </a:r>
+            <a:r>
+              <a:rPr lang="en-US"/>
+              <a:t>and Play New </a:t>
+            </a:r>
+            <a:r>
+              <a:rPr lang="en-US" dirty="0"/>
+              <a:t>Game</a:t>
+            </a:r>
+          </a:p>
+        </p:txBody>
+      </p:sp>
+      <p:sp>
+        <p:nvSpPr>
+          <p:cNvPr id="3" name="Smiley Face 2">
+            <a:extLst>
+              <a:ext uri="{FF2B5EF4-FFF2-40B4-BE49-F238E27FC236}">
+                <a16:creationId xmlns:a16="http://schemas.microsoft.com/office/drawing/2014/main" id="{A5FE8195-4316-B378-0D49-1F3AD65F3AE1}"/>
+              </a:ext>
+            </a:extLst>
+          </p:cNvPr>
+          <p:cNvSpPr/>
+          <p:nvPr/>
+        </p:nvSpPr>
+        <p:spPr>
+          <a:xfrm>
+            <a:off x="5744838" y="1096254"/>
+            <a:ext cx="174147" cy="170870"/>
+          </a:xfrm>
+          <a:prstGeom prst="smileyFace">
+            <a:avLst/>
+          </a:prstGeom>
+        </p:spPr>
+        <p:style>
+          <a:lnRef idx="2">
+            <a:schemeClr val="accent1">
+              <a:shade val="15000"/>
+            </a:schemeClr>
+          </a:lnRef>
+          <a:fillRef idx="1">
+            <a:schemeClr val="accent1"/>
+          </a:fillRef>
+          <a:effectRef idx="0">
+            <a:schemeClr val="accent1"/>
+          </a:effectRef>
+          <a:fontRef idx="minor">
+            <a:schemeClr val="lt1"/>
+          </a:fontRef>
+        </p:style>
+        <p:txBody>
+          <a:bodyPr rtlCol="0" anchor="ctr"/>
+          <a:lstStyle/>
+          <a:p>
+            <a:pPr algn="ctr"/>
+            <a:endParaRPr lang="en-US" dirty="0"/>
+          </a:p>
+        </p:txBody>
+      </p:sp>
+      <p:sp>
+        <p:nvSpPr>
+          <p:cNvPr id="4" name="Rectangle 3">
+            <a:extLst>
+              <a:ext uri="{FF2B5EF4-FFF2-40B4-BE49-F238E27FC236}">
+                <a16:creationId xmlns:a16="http://schemas.microsoft.com/office/drawing/2014/main" id="{5895AB41-3B1C-BD8F-A481-A5ED4D002BC2}"/>
+              </a:ext>
+            </a:extLst>
+          </p:cNvPr>
+          <p:cNvSpPr/>
+          <p:nvPr/>
+        </p:nvSpPr>
+        <p:spPr>
+          <a:xfrm>
+            <a:off x="6554019" y="1468016"/>
+            <a:ext cx="1248868" cy="1030388"/>
+          </a:xfrm>
+          <a:prstGeom prst="rect">
+            <a:avLst/>
+          </a:prstGeom>
+          <a:noFill/>
+        </p:spPr>
+        <p:style>
+          <a:lnRef idx="2">
+            <a:schemeClr val="accent1">
+              <a:shade val="15000"/>
+            </a:schemeClr>
+          </a:lnRef>
+          <a:fillRef idx="1">
+            <a:schemeClr val="accent1"/>
+          </a:fillRef>
+          <a:effectRef idx="0">
+            <a:schemeClr val="accent1"/>
+          </a:effectRef>
+          <a:fontRef idx="minor">
+            <a:schemeClr val="lt1"/>
+          </a:fontRef>
+        </p:style>
+        <p:txBody>
+          <a:bodyPr rtlCol="0" anchor="t" anchorCtr="0"/>
+          <a:lstStyle/>
+          <a:p>
+            <a:pPr algn="ctr"/>
+            <a:r>
+              <a:rPr lang="en-US" sz="900" dirty="0">
+                <a:solidFill>
+                  <a:schemeClr val="tx1"/>
+                </a:solidFill>
+              </a:rPr>
+              <a:t>/</a:t>
+            </a:r>
+            <a:r>
+              <a:rPr lang="en-US" sz="900" dirty="0" err="1">
+                <a:solidFill>
+                  <a:schemeClr val="tx1"/>
+                </a:solidFill>
+              </a:rPr>
+              <a:t>play.ts</a:t>
+            </a:r>
+            <a:endParaRPr lang="en-US" sz="900" dirty="0">
+              <a:solidFill>
+                <a:schemeClr val="tx1"/>
+              </a:solidFill>
+            </a:endParaRPr>
+          </a:p>
+        </p:txBody>
+      </p:sp>
+      <p:sp>
+        <p:nvSpPr>
+          <p:cNvPr id="6" name="Rectangle 5">
+            <a:extLst>
+              <a:ext uri="{FF2B5EF4-FFF2-40B4-BE49-F238E27FC236}">
+                <a16:creationId xmlns:a16="http://schemas.microsoft.com/office/drawing/2014/main" id="{C172A6F9-8855-1645-9903-61A2569960EC}"/>
+              </a:ext>
+            </a:extLst>
+          </p:cNvPr>
+          <p:cNvSpPr/>
+          <p:nvPr/>
+        </p:nvSpPr>
+        <p:spPr>
+          <a:xfrm>
+            <a:off x="6624740" y="1755417"/>
+            <a:ext cx="1085850" cy="654929"/>
+          </a:xfrm>
+          <a:prstGeom prst="rect">
+            <a:avLst/>
+          </a:prstGeom>
+        </p:spPr>
+        <p:style>
+          <a:lnRef idx="2">
+            <a:schemeClr val="accent1">
+              <a:shade val="15000"/>
+            </a:schemeClr>
+          </a:lnRef>
+          <a:fillRef idx="1">
+            <a:schemeClr val="accent1"/>
+          </a:fillRef>
+          <a:effectRef idx="0">
+            <a:schemeClr val="accent1"/>
+          </a:effectRef>
+          <a:fontRef idx="minor">
+            <a:schemeClr val="lt1"/>
+          </a:fontRef>
+        </p:style>
+        <p:txBody>
+          <a:bodyPr rtlCol="0" anchor="b" anchorCtr="0"/>
+          <a:lstStyle/>
+          <a:p>
+            <a:pPr algn="ctr"/>
+            <a:r>
+              <a:rPr lang="en-US" sz="900" dirty="0" err="1"/>
+              <a:t>HTMLConsole</a:t>
+            </a:r>
+            <a:endParaRPr lang="en-US" sz="900" dirty="0"/>
+          </a:p>
+        </p:txBody>
+      </p:sp>
+      <p:sp>
+        <p:nvSpPr>
+          <p:cNvPr id="7" name="Rectangle 6">
+            <a:extLst>
+              <a:ext uri="{FF2B5EF4-FFF2-40B4-BE49-F238E27FC236}">
+                <a16:creationId xmlns:a16="http://schemas.microsoft.com/office/drawing/2014/main" id="{0F136BFE-876A-306D-01EF-A58949E1CCFE}"/>
+              </a:ext>
+            </a:extLst>
+          </p:cNvPr>
+          <p:cNvSpPr/>
+          <p:nvPr/>
+        </p:nvSpPr>
+        <p:spPr>
+          <a:xfrm>
+            <a:off x="6743990" y="1797976"/>
+            <a:ext cx="868925" cy="315589"/>
+          </a:xfrm>
+          <a:prstGeom prst="rect">
+            <a:avLst/>
+          </a:prstGeom>
+        </p:spPr>
+        <p:style>
+          <a:lnRef idx="2">
+            <a:schemeClr val="accent1">
+              <a:shade val="15000"/>
+            </a:schemeClr>
+          </a:lnRef>
+          <a:fillRef idx="1">
+            <a:schemeClr val="accent1"/>
+          </a:fillRef>
+          <a:effectRef idx="0">
+            <a:schemeClr val="accent1"/>
+          </a:effectRef>
+          <a:fontRef idx="minor">
+            <a:schemeClr val="lt1"/>
+          </a:fontRef>
+        </p:style>
+        <p:txBody>
+          <a:bodyPr rtlCol="0" anchor="ctr"/>
+          <a:lstStyle/>
+          <a:p>
+            <a:pPr algn="ctr"/>
+            <a:r>
+              <a:rPr lang="en-US" sz="900" dirty="0" err="1"/>
+              <a:t>HTMLCanvas</a:t>
+            </a:r>
+            <a:endParaRPr lang="en-US" sz="900" dirty="0"/>
+          </a:p>
+        </p:txBody>
+      </p:sp>
+      <p:sp>
+        <p:nvSpPr>
+          <p:cNvPr id="8" name="Cloud 7">
+            <a:extLst>
+              <a:ext uri="{FF2B5EF4-FFF2-40B4-BE49-F238E27FC236}">
+                <a16:creationId xmlns:a16="http://schemas.microsoft.com/office/drawing/2014/main" id="{CE9D2222-B765-8243-F490-351231E50B29}"/>
+              </a:ext>
+            </a:extLst>
+          </p:cNvPr>
+          <p:cNvSpPr/>
+          <p:nvPr/>
+        </p:nvSpPr>
+        <p:spPr>
+          <a:xfrm>
+            <a:off x="5196689" y="2047835"/>
+            <a:ext cx="1248868" cy="788563"/>
+          </a:xfrm>
+          <a:prstGeom prst="cloud">
+            <a:avLst/>
+          </a:prstGeom>
+          <a:noFill/>
+        </p:spPr>
+        <p:style>
+          <a:lnRef idx="2">
+            <a:schemeClr val="accent1">
+              <a:shade val="15000"/>
+            </a:schemeClr>
+          </a:lnRef>
+          <a:fillRef idx="1">
+            <a:schemeClr val="accent1"/>
+          </a:fillRef>
+          <a:effectRef idx="0">
+            <a:schemeClr val="accent1"/>
+          </a:effectRef>
+          <a:fontRef idx="minor">
+            <a:schemeClr val="lt1"/>
+          </a:fontRef>
+        </p:style>
+        <p:txBody>
+          <a:bodyPr rtlCol="0" anchor="ctr"/>
+          <a:lstStyle/>
+          <a:p>
+            <a:pPr algn="ctr"/>
+            <a:endParaRPr lang="en-US"/>
+          </a:p>
+        </p:txBody>
+      </p:sp>
+      <p:sp>
+        <p:nvSpPr>
+          <p:cNvPr id="9" name="Rectangle 8">
+            <a:extLst>
+              <a:ext uri="{FF2B5EF4-FFF2-40B4-BE49-F238E27FC236}">
+                <a16:creationId xmlns:a16="http://schemas.microsoft.com/office/drawing/2014/main" id="{F20F36D2-6A7F-4940-FA54-D9F72BD235FD}"/>
+              </a:ext>
+            </a:extLst>
+          </p:cNvPr>
+          <p:cNvSpPr/>
+          <p:nvPr/>
+        </p:nvSpPr>
+        <p:spPr>
+          <a:xfrm>
+            <a:off x="6748855" y="3191135"/>
+            <a:ext cx="868925" cy="315589"/>
+          </a:xfrm>
+          <a:prstGeom prst="rect">
+            <a:avLst/>
+          </a:prstGeom>
+        </p:spPr>
+        <p:style>
+          <a:lnRef idx="2">
+            <a:schemeClr val="accent1">
+              <a:shade val="15000"/>
+            </a:schemeClr>
+          </a:lnRef>
+          <a:fillRef idx="1">
+            <a:schemeClr val="accent1"/>
+          </a:fillRef>
+          <a:effectRef idx="0">
+            <a:schemeClr val="accent1"/>
+          </a:effectRef>
+          <a:fontRef idx="minor">
+            <a:schemeClr val="lt1"/>
+          </a:fontRef>
+        </p:style>
+        <p:txBody>
+          <a:bodyPr rtlCol="0" anchor="ctr"/>
+          <a:lstStyle/>
+          <a:p>
+            <a:pPr algn="ctr"/>
+            <a:r>
+              <a:rPr lang="en-US" sz="900" dirty="0" err="1"/>
+              <a:t>SignalRHub</a:t>
+            </a:r>
+            <a:endParaRPr lang="en-US" sz="900" dirty="0"/>
+          </a:p>
+        </p:txBody>
+      </p:sp>
+      <p:sp>
+        <p:nvSpPr>
+          <p:cNvPr id="10" name="Rectangle 9">
+            <a:extLst>
+              <a:ext uri="{FF2B5EF4-FFF2-40B4-BE49-F238E27FC236}">
+                <a16:creationId xmlns:a16="http://schemas.microsoft.com/office/drawing/2014/main" id="{5681CE96-4C6A-3238-4AAA-63384767AD45}"/>
+              </a:ext>
+            </a:extLst>
+          </p:cNvPr>
+          <p:cNvSpPr/>
+          <p:nvPr/>
+        </p:nvSpPr>
+        <p:spPr>
+          <a:xfrm>
+            <a:off x="5196689" y="1474687"/>
+            <a:ext cx="1248868" cy="282979"/>
+          </a:xfrm>
+          <a:prstGeom prst="rect">
+            <a:avLst/>
+          </a:prstGeom>
+          <a:noFill/>
+        </p:spPr>
+        <p:style>
+          <a:lnRef idx="2">
+            <a:schemeClr val="accent1">
+              <a:shade val="15000"/>
+            </a:schemeClr>
+          </a:lnRef>
+          <a:fillRef idx="1">
+            <a:schemeClr val="accent1"/>
+          </a:fillRef>
+          <a:effectRef idx="0">
+            <a:schemeClr val="accent1"/>
+          </a:effectRef>
+          <a:fontRef idx="minor">
+            <a:schemeClr val="lt1"/>
+          </a:fontRef>
+        </p:style>
+        <p:txBody>
+          <a:bodyPr rtlCol="0" anchor="t" anchorCtr="0"/>
+          <a:lstStyle/>
+          <a:p>
+            <a:pPr algn="ctr"/>
+            <a:r>
+              <a:rPr lang="en-US" sz="900" dirty="0">
+                <a:solidFill>
+                  <a:schemeClr val="tx1"/>
+                </a:solidFill>
+              </a:rPr>
+              <a:t>/</a:t>
+            </a:r>
+            <a:r>
+              <a:rPr lang="en-US" sz="900" dirty="0" err="1">
+                <a:solidFill>
+                  <a:schemeClr val="tx1"/>
+                </a:solidFill>
+              </a:rPr>
+              <a:t>play.ts</a:t>
+            </a:r>
+            <a:endParaRPr lang="en-US" sz="900" dirty="0">
+              <a:solidFill>
+                <a:schemeClr val="tx1"/>
+              </a:solidFill>
+            </a:endParaRPr>
+          </a:p>
+        </p:txBody>
+      </p:sp>
+      <p:sp>
+        <p:nvSpPr>
+          <p:cNvPr id="13" name="Rectangle 12">
+            <a:extLst>
+              <a:ext uri="{FF2B5EF4-FFF2-40B4-BE49-F238E27FC236}">
+                <a16:creationId xmlns:a16="http://schemas.microsoft.com/office/drawing/2014/main" id="{6714259B-86E2-B7F7-E207-FA114F60CB62}"/>
+              </a:ext>
+            </a:extLst>
+          </p:cNvPr>
+          <p:cNvSpPr/>
+          <p:nvPr/>
+        </p:nvSpPr>
+        <p:spPr>
+          <a:xfrm>
+            <a:off x="5375386" y="3199998"/>
+            <a:ext cx="891473" cy="390055"/>
+          </a:xfrm>
+          <a:prstGeom prst="rect">
+            <a:avLst/>
+          </a:prstGeom>
+        </p:spPr>
+        <p:style>
+          <a:lnRef idx="2">
+            <a:schemeClr val="accent1">
+              <a:shade val="15000"/>
+            </a:schemeClr>
+          </a:lnRef>
+          <a:fillRef idx="1">
+            <a:schemeClr val="accent1"/>
+          </a:fillRef>
+          <a:effectRef idx="0">
+            <a:schemeClr val="accent1"/>
+          </a:effectRef>
+          <a:fontRef idx="minor">
+            <a:schemeClr val="lt1"/>
+          </a:fontRef>
+        </p:style>
+        <p:txBody>
+          <a:bodyPr rtlCol="0" anchor="b" anchorCtr="0"/>
+          <a:lstStyle/>
+          <a:p>
+            <a:pPr algn="ctr"/>
+            <a:r>
+              <a:rPr lang="en-US" sz="900" dirty="0" err="1"/>
+              <a:t>GameHub</a:t>
+            </a:r>
+            <a:endParaRPr lang="en-US" sz="900" dirty="0"/>
+          </a:p>
+        </p:txBody>
+      </p:sp>
+      <p:sp>
+        <p:nvSpPr>
+          <p:cNvPr id="14" name="Rectangle 13">
+            <a:extLst>
+              <a:ext uri="{FF2B5EF4-FFF2-40B4-BE49-F238E27FC236}">
+                <a16:creationId xmlns:a16="http://schemas.microsoft.com/office/drawing/2014/main" id="{27A162AF-228C-B392-524F-CED1BA08F738}"/>
+              </a:ext>
+            </a:extLst>
+          </p:cNvPr>
+          <p:cNvSpPr/>
+          <p:nvPr/>
+        </p:nvSpPr>
+        <p:spPr>
+          <a:xfrm>
+            <a:off x="5532506" y="3199998"/>
+            <a:ext cx="598810" cy="148932"/>
+          </a:xfrm>
+          <a:prstGeom prst="rect">
+            <a:avLst/>
+          </a:prstGeom>
+        </p:spPr>
+        <p:style>
+          <a:lnRef idx="2">
+            <a:schemeClr val="accent1">
+              <a:shade val="15000"/>
+            </a:schemeClr>
+          </a:lnRef>
+          <a:fillRef idx="1">
+            <a:schemeClr val="accent1"/>
+          </a:fillRef>
+          <a:effectRef idx="0">
+            <a:schemeClr val="accent1"/>
+          </a:effectRef>
+          <a:fontRef idx="minor">
+            <a:schemeClr val="lt1"/>
+          </a:fontRef>
+        </p:style>
+        <p:txBody>
+          <a:bodyPr lIns="0" tIns="0" rIns="0" bIns="0" rtlCol="0" anchor="ctr"/>
+          <a:lstStyle/>
+          <a:p>
+            <a:pPr algn="ctr"/>
+            <a:r>
+              <a:rPr lang="en-US" sz="900" dirty="0"/>
+              <a:t>Play()</a:t>
+            </a:r>
+          </a:p>
+        </p:txBody>
+      </p:sp>
+      <p:cxnSp>
+        <p:nvCxnSpPr>
+          <p:cNvPr id="16" name="Straight Arrow Connector 15">
+            <a:extLst>
+              <a:ext uri="{FF2B5EF4-FFF2-40B4-BE49-F238E27FC236}">
+                <a16:creationId xmlns:a16="http://schemas.microsoft.com/office/drawing/2014/main" id="{04F5A2D8-9A13-26B4-9D4F-2B5A1A9C20BF}"/>
+              </a:ext>
+            </a:extLst>
+          </p:cNvPr>
+          <p:cNvCxnSpPr>
+            <a:cxnSpLocks/>
+            <a:stCxn id="10" idx="2"/>
+            <a:endCxn id="14" idx="0"/>
+          </p:cNvCxnSpPr>
+          <p:nvPr/>
+        </p:nvCxnSpPr>
+        <p:spPr>
+          <a:xfrm>
+            <a:off x="5821123" y="1757666"/>
+            <a:ext cx="10788" cy="1442332"/>
+          </a:xfrm>
+          <a:prstGeom prst="straightConnector1">
+            <a:avLst/>
+          </a:prstGeom>
+          <a:ln>
+            <a:tailEnd type="triangle"/>
+          </a:ln>
+        </p:spPr>
+        <p:style>
+          <a:lnRef idx="1">
+            <a:schemeClr val="accent1"/>
+          </a:lnRef>
+          <a:fillRef idx="0">
+            <a:schemeClr val="accent1"/>
+          </a:fillRef>
+          <a:effectRef idx="0">
+            <a:schemeClr val="accent1"/>
+          </a:effectRef>
+          <a:fontRef idx="minor">
+            <a:schemeClr val="tx1"/>
+          </a:fontRef>
+        </p:style>
+      </p:cxnSp>
+      <p:sp>
+        <p:nvSpPr>
+          <p:cNvPr id="17" name="Rectangle 16">
+            <a:extLst>
+              <a:ext uri="{FF2B5EF4-FFF2-40B4-BE49-F238E27FC236}">
+                <a16:creationId xmlns:a16="http://schemas.microsoft.com/office/drawing/2014/main" id="{373C7360-A3B5-9A60-924D-D8B14E91066E}"/>
+              </a:ext>
+            </a:extLst>
+          </p:cNvPr>
+          <p:cNvSpPr/>
+          <p:nvPr/>
+        </p:nvSpPr>
+        <p:spPr>
+          <a:xfrm>
+            <a:off x="3099842" y="1514997"/>
+            <a:ext cx="2096847" cy="282979"/>
+          </a:xfrm>
+          <a:prstGeom prst="rect">
+            <a:avLst/>
+          </a:prstGeom>
+          <a:noFill/>
+          <a:ln>
+            <a:noFill/>
+          </a:ln>
+        </p:spPr>
+        <p:style>
+          <a:lnRef idx="2">
+            <a:schemeClr val="accent1">
+              <a:shade val="15000"/>
+            </a:schemeClr>
+          </a:lnRef>
+          <a:fillRef idx="1">
+            <a:schemeClr val="accent1"/>
+          </a:fillRef>
+          <a:effectRef idx="0">
+            <a:schemeClr val="accent1"/>
+          </a:effectRef>
+          <a:fontRef idx="minor">
+            <a:schemeClr val="lt1"/>
+          </a:fontRef>
+        </p:style>
+        <p:txBody>
+          <a:bodyPr rtlCol="0" anchor="t" anchorCtr="0"/>
+          <a:lstStyle/>
+          <a:p>
+            <a:pPr algn="ctr"/>
+            <a:r>
+              <a:rPr lang="en-US" sz="900" dirty="0">
+                <a:solidFill>
+                  <a:schemeClr val="tx1"/>
+                </a:solidFill>
+              </a:rPr>
+              <a:t>1. User navigates to the play component</a:t>
+            </a:r>
+          </a:p>
+        </p:txBody>
+      </p:sp>
+      <p:sp>
+        <p:nvSpPr>
+          <p:cNvPr id="18" name="Rectangle 17">
+            <a:extLst>
+              <a:ext uri="{FF2B5EF4-FFF2-40B4-BE49-F238E27FC236}">
+                <a16:creationId xmlns:a16="http://schemas.microsoft.com/office/drawing/2014/main" id="{1208D908-E8AB-BFA4-3327-D95699E02B35}"/>
+              </a:ext>
+            </a:extLst>
+          </p:cNvPr>
+          <p:cNvSpPr/>
+          <p:nvPr/>
+        </p:nvSpPr>
+        <p:spPr>
+          <a:xfrm>
+            <a:off x="3095958" y="3148067"/>
+            <a:ext cx="2096847" cy="493915"/>
+          </a:xfrm>
+          <a:prstGeom prst="rect">
+            <a:avLst/>
+          </a:prstGeom>
+          <a:noFill/>
+          <a:ln>
+            <a:noFill/>
+          </a:ln>
+        </p:spPr>
+        <p:style>
+          <a:lnRef idx="2">
+            <a:schemeClr val="accent1">
+              <a:shade val="15000"/>
+            </a:schemeClr>
+          </a:lnRef>
+          <a:fillRef idx="1">
+            <a:schemeClr val="accent1"/>
+          </a:fillRef>
+          <a:effectRef idx="0">
+            <a:schemeClr val="accent1"/>
+          </a:effectRef>
+          <a:fontRef idx="minor">
+            <a:schemeClr val="lt1"/>
+          </a:fontRef>
+        </p:style>
+        <p:txBody>
+          <a:bodyPr rtlCol="0" anchor="t" anchorCtr="0"/>
+          <a:lstStyle/>
+          <a:p>
+            <a:pPr algn="ctr"/>
+            <a:r>
+              <a:rPr lang="en-US" sz="900" dirty="0">
+                <a:solidFill>
+                  <a:schemeClr val="tx1"/>
+                </a:solidFill>
+              </a:rPr>
+              <a:t>2. Play component calls the Play() method on the </a:t>
+            </a:r>
+            <a:r>
+              <a:rPr lang="en-US" sz="900" dirty="0" err="1">
+                <a:solidFill>
+                  <a:schemeClr val="tx1"/>
+                </a:solidFill>
+              </a:rPr>
+              <a:t>GameHub</a:t>
+            </a:r>
+            <a:r>
+              <a:rPr lang="en-US" sz="900" dirty="0">
+                <a:solidFill>
+                  <a:schemeClr val="tx1"/>
+                </a:solidFill>
+              </a:rPr>
+              <a:t> with a null game </a:t>
+            </a:r>
+            <a:r>
+              <a:rPr lang="en-US" sz="900" dirty="0" err="1">
+                <a:solidFill>
+                  <a:schemeClr val="tx1"/>
+                </a:solidFill>
+              </a:rPr>
+              <a:t>guid</a:t>
+            </a:r>
+            <a:endParaRPr lang="en-US" sz="900" dirty="0">
+              <a:solidFill>
+                <a:schemeClr val="tx1"/>
+              </a:solidFill>
+            </a:endParaRPr>
+          </a:p>
+        </p:txBody>
+      </p:sp>
+      <p:sp>
+        <p:nvSpPr>
+          <p:cNvPr id="19" name="Rectangle 18">
+            <a:extLst>
+              <a:ext uri="{FF2B5EF4-FFF2-40B4-BE49-F238E27FC236}">
+                <a16:creationId xmlns:a16="http://schemas.microsoft.com/office/drawing/2014/main" id="{9B59292E-6EDA-E378-D6C6-01DC7EB2B3F2}"/>
+              </a:ext>
+            </a:extLst>
+          </p:cNvPr>
+          <p:cNvSpPr/>
+          <p:nvPr/>
+        </p:nvSpPr>
+        <p:spPr>
+          <a:xfrm>
+            <a:off x="3095958" y="3750198"/>
+            <a:ext cx="2096847" cy="436291"/>
+          </a:xfrm>
+          <a:prstGeom prst="rect">
+            <a:avLst/>
+          </a:prstGeom>
+          <a:noFill/>
+          <a:ln>
+            <a:noFill/>
+          </a:ln>
+        </p:spPr>
+        <p:style>
+          <a:lnRef idx="2">
+            <a:schemeClr val="accent1">
+              <a:shade val="15000"/>
+            </a:schemeClr>
+          </a:lnRef>
+          <a:fillRef idx="1">
+            <a:schemeClr val="accent1"/>
+          </a:fillRef>
+          <a:effectRef idx="0">
+            <a:schemeClr val="accent1"/>
+          </a:effectRef>
+          <a:fontRef idx="minor">
+            <a:schemeClr val="lt1"/>
+          </a:fontRef>
+        </p:style>
+        <p:txBody>
+          <a:bodyPr rtlCol="0" anchor="t" anchorCtr="0"/>
+          <a:lstStyle/>
+          <a:p>
+            <a:pPr algn="ctr"/>
+            <a:r>
+              <a:rPr lang="en-US" sz="900" dirty="0">
+                <a:solidFill>
+                  <a:schemeClr val="tx1"/>
+                </a:solidFill>
+              </a:rPr>
+              <a:t>3. </a:t>
+            </a:r>
+            <a:r>
+              <a:rPr lang="en-US" sz="900" dirty="0" err="1">
+                <a:solidFill>
+                  <a:schemeClr val="tx1"/>
+                </a:solidFill>
+              </a:rPr>
+              <a:t>GameHub</a:t>
+            </a:r>
+            <a:r>
+              <a:rPr lang="en-US" sz="900" dirty="0">
+                <a:solidFill>
+                  <a:schemeClr val="tx1"/>
+                </a:solidFill>
+              </a:rPr>
+              <a:t> sends the request to the </a:t>
+            </a:r>
+            <a:r>
+              <a:rPr lang="en-US" sz="900" dirty="0" err="1">
+                <a:solidFill>
+                  <a:schemeClr val="tx1"/>
+                </a:solidFill>
+              </a:rPr>
+              <a:t>GameService</a:t>
+            </a:r>
+            <a:r>
+              <a:rPr lang="en-US" sz="900" dirty="0">
+                <a:solidFill>
+                  <a:schemeClr val="tx1"/>
+                </a:solidFill>
+              </a:rPr>
+              <a:t> </a:t>
+            </a:r>
+            <a:r>
+              <a:rPr lang="en-US" sz="900" dirty="0" err="1">
+                <a:solidFill>
+                  <a:schemeClr val="tx1"/>
+                </a:solidFill>
+              </a:rPr>
+              <a:t>PlayAsync</a:t>
+            </a:r>
+            <a:r>
+              <a:rPr lang="en-US" sz="900" dirty="0">
+                <a:solidFill>
+                  <a:schemeClr val="tx1"/>
+                </a:solidFill>
+              </a:rPr>
+              <a:t>() method</a:t>
+            </a:r>
+          </a:p>
+        </p:txBody>
+      </p:sp>
+      <p:sp>
+        <p:nvSpPr>
+          <p:cNvPr id="20" name="Rectangle 19">
+            <a:extLst>
+              <a:ext uri="{FF2B5EF4-FFF2-40B4-BE49-F238E27FC236}">
+                <a16:creationId xmlns:a16="http://schemas.microsoft.com/office/drawing/2014/main" id="{B16225C5-80B6-190E-BE05-A17EF04CB78B}"/>
+              </a:ext>
+            </a:extLst>
+          </p:cNvPr>
+          <p:cNvSpPr/>
+          <p:nvPr/>
+        </p:nvSpPr>
+        <p:spPr>
+          <a:xfrm>
+            <a:off x="5373215" y="4227283"/>
+            <a:ext cx="868925" cy="390055"/>
+          </a:xfrm>
+          <a:prstGeom prst="rect">
+            <a:avLst/>
+          </a:prstGeom>
+        </p:spPr>
+        <p:style>
+          <a:lnRef idx="2">
+            <a:schemeClr val="accent1">
+              <a:shade val="15000"/>
+            </a:schemeClr>
+          </a:lnRef>
+          <a:fillRef idx="1">
+            <a:schemeClr val="accent1"/>
+          </a:fillRef>
+          <a:effectRef idx="0">
+            <a:schemeClr val="accent1"/>
+          </a:effectRef>
+          <a:fontRef idx="minor">
+            <a:schemeClr val="lt1"/>
+          </a:fontRef>
+        </p:style>
+        <p:txBody>
+          <a:bodyPr rtlCol="0" anchor="b" anchorCtr="0"/>
+          <a:lstStyle/>
+          <a:p>
+            <a:pPr algn="ctr"/>
+            <a:r>
+              <a:rPr lang="en-US" sz="900" dirty="0" err="1"/>
+              <a:t>GameService</a:t>
+            </a:r>
+            <a:endParaRPr lang="en-US" sz="900" dirty="0"/>
+          </a:p>
+        </p:txBody>
+      </p:sp>
+      <p:cxnSp>
+        <p:nvCxnSpPr>
+          <p:cNvPr id="22" name="Straight Arrow Connector 21">
+            <a:extLst>
+              <a:ext uri="{FF2B5EF4-FFF2-40B4-BE49-F238E27FC236}">
+                <a16:creationId xmlns:a16="http://schemas.microsoft.com/office/drawing/2014/main" id="{22B2166A-FB96-5490-1C22-D85EDA1AF1D0}"/>
+              </a:ext>
+            </a:extLst>
+          </p:cNvPr>
+          <p:cNvCxnSpPr>
+            <a:cxnSpLocks/>
+            <a:stCxn id="13" idx="2"/>
+            <a:endCxn id="20" idx="0"/>
+          </p:cNvCxnSpPr>
+          <p:nvPr/>
+        </p:nvCxnSpPr>
+        <p:spPr>
+          <a:xfrm flipH="1">
+            <a:off x="5807678" y="3590053"/>
+            <a:ext cx="13445" cy="637230"/>
+          </a:xfrm>
+          <a:prstGeom prst="straightConnector1">
+            <a:avLst/>
+          </a:prstGeom>
+          <a:ln>
+            <a:tailEnd type="triangle"/>
+          </a:ln>
+        </p:spPr>
+        <p:style>
+          <a:lnRef idx="1">
+            <a:schemeClr val="accent1"/>
+          </a:lnRef>
+          <a:fillRef idx="0">
+            <a:schemeClr val="accent1"/>
+          </a:fillRef>
+          <a:effectRef idx="0">
+            <a:schemeClr val="accent1"/>
+          </a:effectRef>
+          <a:fontRef idx="minor">
+            <a:schemeClr val="tx1"/>
+          </a:fontRef>
+        </p:style>
+      </p:cxnSp>
+      <p:sp>
+        <p:nvSpPr>
+          <p:cNvPr id="24" name="Rectangle 23">
+            <a:extLst>
+              <a:ext uri="{FF2B5EF4-FFF2-40B4-BE49-F238E27FC236}">
+                <a16:creationId xmlns:a16="http://schemas.microsoft.com/office/drawing/2014/main" id="{622DDF5B-C55C-EADD-96BB-896A9244B391}"/>
+              </a:ext>
+            </a:extLst>
+          </p:cNvPr>
+          <p:cNvSpPr/>
+          <p:nvPr/>
+        </p:nvSpPr>
+        <p:spPr>
+          <a:xfrm>
+            <a:off x="5508272" y="4244113"/>
+            <a:ext cx="598810" cy="148932"/>
+          </a:xfrm>
+          <a:prstGeom prst="rect">
+            <a:avLst/>
+          </a:prstGeom>
+        </p:spPr>
+        <p:style>
+          <a:lnRef idx="2">
+            <a:schemeClr val="accent1">
+              <a:shade val="15000"/>
+            </a:schemeClr>
+          </a:lnRef>
+          <a:fillRef idx="1">
+            <a:schemeClr val="accent1"/>
+          </a:fillRef>
+          <a:effectRef idx="0">
+            <a:schemeClr val="accent1"/>
+          </a:effectRef>
+          <a:fontRef idx="minor">
+            <a:schemeClr val="lt1"/>
+          </a:fontRef>
+        </p:style>
+        <p:txBody>
+          <a:bodyPr lIns="0" tIns="0" rIns="0" bIns="0" rtlCol="0" anchor="ctr"/>
+          <a:lstStyle/>
+          <a:p>
+            <a:pPr algn="ctr"/>
+            <a:r>
+              <a:rPr lang="en-US" sz="900" dirty="0" err="1"/>
+              <a:t>PlayAsync</a:t>
+            </a:r>
+            <a:r>
+              <a:rPr lang="en-US" sz="900" dirty="0"/>
+              <a:t>()</a:t>
+            </a:r>
+          </a:p>
+        </p:txBody>
+      </p:sp>
+      <p:cxnSp>
+        <p:nvCxnSpPr>
+          <p:cNvPr id="27" name="Straight Arrow Connector 26">
+            <a:extLst>
+              <a:ext uri="{FF2B5EF4-FFF2-40B4-BE49-F238E27FC236}">
+                <a16:creationId xmlns:a16="http://schemas.microsoft.com/office/drawing/2014/main" id="{CC16B335-165E-2652-7A9B-249FB37B0B40}"/>
+              </a:ext>
+            </a:extLst>
+          </p:cNvPr>
+          <p:cNvCxnSpPr>
+            <a:cxnSpLocks/>
+            <a:stCxn id="20" idx="3"/>
+            <a:endCxn id="9" idx="2"/>
+          </p:cNvCxnSpPr>
+          <p:nvPr/>
+        </p:nvCxnSpPr>
+        <p:spPr>
+          <a:xfrm flipV="1">
+            <a:off x="6242140" y="3506724"/>
+            <a:ext cx="941178" cy="915587"/>
+          </a:xfrm>
+          <a:prstGeom prst="straightConnector1">
+            <a:avLst/>
+          </a:prstGeom>
+          <a:ln>
+            <a:tailEnd type="triangle"/>
+          </a:ln>
+        </p:spPr>
+        <p:style>
+          <a:lnRef idx="1">
+            <a:schemeClr val="accent1"/>
+          </a:lnRef>
+          <a:fillRef idx="0">
+            <a:schemeClr val="accent1"/>
+          </a:fillRef>
+          <a:effectRef idx="0">
+            <a:schemeClr val="accent1"/>
+          </a:effectRef>
+          <a:fontRef idx="minor">
+            <a:schemeClr val="tx1"/>
+          </a:fontRef>
+        </p:style>
+      </p:cxnSp>
+      <p:sp>
+        <p:nvSpPr>
+          <p:cNvPr id="30" name="Rectangle 29">
+            <a:extLst>
+              <a:ext uri="{FF2B5EF4-FFF2-40B4-BE49-F238E27FC236}">
+                <a16:creationId xmlns:a16="http://schemas.microsoft.com/office/drawing/2014/main" id="{C4D62BA6-F6D8-15F6-1110-48E45E1C380F}"/>
+              </a:ext>
+            </a:extLst>
+          </p:cNvPr>
+          <p:cNvSpPr/>
+          <p:nvPr/>
+        </p:nvSpPr>
+        <p:spPr>
+          <a:xfrm>
+            <a:off x="6655312" y="3885706"/>
+            <a:ext cx="2096847" cy="436291"/>
+          </a:xfrm>
+          <a:prstGeom prst="rect">
+            <a:avLst/>
+          </a:prstGeom>
+          <a:noFill/>
+          <a:ln>
+            <a:noFill/>
+          </a:ln>
+        </p:spPr>
+        <p:style>
+          <a:lnRef idx="2">
+            <a:schemeClr val="accent1">
+              <a:shade val="15000"/>
+            </a:schemeClr>
+          </a:lnRef>
+          <a:fillRef idx="1">
+            <a:schemeClr val="accent1"/>
+          </a:fillRef>
+          <a:effectRef idx="0">
+            <a:schemeClr val="accent1"/>
+          </a:effectRef>
+          <a:fontRef idx="minor">
+            <a:schemeClr val="lt1"/>
+          </a:fontRef>
+        </p:style>
+        <p:txBody>
+          <a:bodyPr rtlCol="0" anchor="t" anchorCtr="0"/>
+          <a:lstStyle/>
+          <a:p>
+            <a:pPr algn="ctr"/>
+            <a:r>
+              <a:rPr lang="en-US" sz="900" dirty="0">
+                <a:solidFill>
+                  <a:schemeClr val="tx1"/>
+                </a:solidFill>
+              </a:rPr>
+              <a:t>4. </a:t>
+            </a:r>
+            <a:r>
+              <a:rPr lang="en-US" sz="900" dirty="0" err="1">
+                <a:solidFill>
+                  <a:schemeClr val="tx1"/>
+                </a:solidFill>
+              </a:rPr>
+              <a:t>GameService</a:t>
+            </a:r>
+            <a:r>
+              <a:rPr lang="en-US" sz="900" dirty="0">
+                <a:solidFill>
+                  <a:schemeClr val="tx1"/>
+                </a:solidFill>
+              </a:rPr>
+              <a:t> creates a Core game and provides it to a new </a:t>
+            </a:r>
+            <a:r>
+              <a:rPr lang="en-US" sz="900" dirty="0" err="1">
+                <a:solidFill>
+                  <a:schemeClr val="tx1"/>
+                </a:solidFill>
+              </a:rPr>
+              <a:t>SignalRHub</a:t>
+            </a:r>
+            <a:r>
+              <a:rPr lang="en-US" sz="900" dirty="0">
+                <a:solidFill>
+                  <a:schemeClr val="tx1"/>
+                </a:solidFill>
+              </a:rPr>
+              <a:t> object to communicate with the client</a:t>
+            </a:r>
+          </a:p>
+        </p:txBody>
+      </p:sp>
+      <p:sp>
+        <p:nvSpPr>
+          <p:cNvPr id="32" name="Rectangle 31">
+            <a:extLst>
+              <a:ext uri="{FF2B5EF4-FFF2-40B4-BE49-F238E27FC236}">
+                <a16:creationId xmlns:a16="http://schemas.microsoft.com/office/drawing/2014/main" id="{2BC8FD4E-0174-C6A6-97BE-DB5A3FBF5E23}"/>
+              </a:ext>
+            </a:extLst>
+          </p:cNvPr>
+          <p:cNvSpPr/>
+          <p:nvPr/>
+        </p:nvSpPr>
+        <p:spPr>
+          <a:xfrm>
+            <a:off x="7257827" y="3606082"/>
+            <a:ext cx="355088" cy="278669"/>
+          </a:xfrm>
+          <a:prstGeom prst="rect">
+            <a:avLst/>
+          </a:prstGeom>
+        </p:spPr>
+        <p:style>
+          <a:lnRef idx="2">
+            <a:schemeClr val="accent1">
+              <a:shade val="15000"/>
+            </a:schemeClr>
+          </a:lnRef>
+          <a:fillRef idx="1">
+            <a:schemeClr val="accent1"/>
+          </a:fillRef>
+          <a:effectRef idx="0">
+            <a:schemeClr val="accent1"/>
+          </a:effectRef>
+          <a:fontRef idx="minor">
+            <a:schemeClr val="lt1"/>
+          </a:fontRef>
+        </p:style>
+        <p:txBody>
+          <a:bodyPr lIns="0" tIns="0" rIns="0" bIns="0" rtlCol="0" anchor="ctr"/>
+          <a:lstStyle/>
+          <a:p>
+            <a:pPr algn="ctr"/>
+            <a:r>
+              <a:rPr lang="en-US" sz="900" dirty="0"/>
+              <a:t>Core</a:t>
+            </a:r>
+          </a:p>
+        </p:txBody>
+      </p:sp>
+      <p:cxnSp>
+        <p:nvCxnSpPr>
+          <p:cNvPr id="35" name="Straight Arrow Connector 34">
+            <a:extLst>
+              <a:ext uri="{FF2B5EF4-FFF2-40B4-BE49-F238E27FC236}">
+                <a16:creationId xmlns:a16="http://schemas.microsoft.com/office/drawing/2014/main" id="{02BF26EC-F4CC-6675-606A-1ABCEBEB9B9D}"/>
+              </a:ext>
+            </a:extLst>
+          </p:cNvPr>
+          <p:cNvCxnSpPr>
+            <a:stCxn id="9" idx="0"/>
+            <a:endCxn id="6" idx="2"/>
+          </p:cNvCxnSpPr>
+          <p:nvPr/>
+        </p:nvCxnSpPr>
+        <p:spPr>
+          <a:xfrm flipH="1" flipV="1">
+            <a:off x="7167665" y="2410346"/>
+            <a:ext cx="15653" cy="780789"/>
+          </a:xfrm>
+          <a:prstGeom prst="straightConnector1">
+            <a:avLst/>
+          </a:prstGeom>
+          <a:ln>
+            <a:tailEnd type="triangle"/>
+          </a:ln>
+        </p:spPr>
+        <p:style>
+          <a:lnRef idx="1">
+            <a:schemeClr val="accent1"/>
+          </a:lnRef>
+          <a:fillRef idx="0">
+            <a:schemeClr val="accent1"/>
+          </a:fillRef>
+          <a:effectRef idx="0">
+            <a:schemeClr val="accent1"/>
+          </a:effectRef>
+          <a:fontRef idx="minor">
+            <a:schemeClr val="tx1"/>
+          </a:fontRef>
+        </p:style>
+      </p:cxnSp>
+      <p:sp>
+        <p:nvSpPr>
+          <p:cNvPr id="37" name="Rectangle 36">
+            <a:extLst>
+              <a:ext uri="{FF2B5EF4-FFF2-40B4-BE49-F238E27FC236}">
+                <a16:creationId xmlns:a16="http://schemas.microsoft.com/office/drawing/2014/main" id="{52240882-EB3A-6589-E612-18B22B3E7F4B}"/>
+              </a:ext>
+            </a:extLst>
+          </p:cNvPr>
+          <p:cNvSpPr/>
+          <p:nvPr/>
+        </p:nvSpPr>
+        <p:spPr>
+          <a:xfrm>
+            <a:off x="7257827" y="2609564"/>
+            <a:ext cx="2096847" cy="436291"/>
+          </a:xfrm>
+          <a:prstGeom prst="rect">
+            <a:avLst/>
+          </a:prstGeom>
+          <a:noFill/>
+          <a:ln>
+            <a:noFill/>
+          </a:ln>
+        </p:spPr>
+        <p:style>
+          <a:lnRef idx="2">
+            <a:schemeClr val="accent1">
+              <a:shade val="15000"/>
+            </a:schemeClr>
+          </a:lnRef>
+          <a:fillRef idx="1">
+            <a:schemeClr val="accent1"/>
+          </a:fillRef>
+          <a:effectRef idx="0">
+            <a:schemeClr val="accent1"/>
+          </a:effectRef>
+          <a:fontRef idx="minor">
+            <a:schemeClr val="lt1"/>
+          </a:fontRef>
+        </p:style>
+        <p:txBody>
+          <a:bodyPr rtlCol="0" anchor="t" anchorCtr="0"/>
+          <a:lstStyle/>
+          <a:p>
+            <a:pPr algn="ctr"/>
+            <a:r>
+              <a:rPr lang="en-US" sz="900" dirty="0">
+                <a:solidFill>
+                  <a:schemeClr val="tx1"/>
+                </a:solidFill>
+              </a:rPr>
+              <a:t>5. The </a:t>
+            </a:r>
+            <a:r>
+              <a:rPr lang="en-US" sz="900" dirty="0" err="1">
+                <a:solidFill>
+                  <a:schemeClr val="tx1"/>
+                </a:solidFill>
+              </a:rPr>
+              <a:t>SignalRHub</a:t>
+            </a:r>
+            <a:r>
+              <a:rPr lang="en-US" sz="900" dirty="0">
+                <a:solidFill>
+                  <a:schemeClr val="tx1"/>
+                </a:solidFill>
+              </a:rPr>
+              <a:t> sends game communication to the </a:t>
+            </a:r>
+            <a:r>
+              <a:rPr lang="en-US" sz="900" dirty="0" err="1">
+                <a:solidFill>
+                  <a:schemeClr val="tx1"/>
+                </a:solidFill>
+              </a:rPr>
+              <a:t>HTMLConsole</a:t>
+            </a:r>
+            <a:r>
+              <a:rPr lang="en-US" sz="900" dirty="0">
+                <a:solidFill>
+                  <a:schemeClr val="tx1"/>
+                </a:solidFill>
+              </a:rPr>
+              <a:t> module</a:t>
+            </a:r>
+          </a:p>
+        </p:txBody>
+      </p:sp>
+    </p:spTree>
+    <p:extLst>
+      <p:ext uri="{BB962C8B-B14F-4D97-AF65-F5344CB8AC3E}">
+        <p14:creationId xmlns:p14="http://schemas.microsoft.com/office/powerpoint/2010/main" val="724311830"/>
+      </p:ext>
+    </p:extLst>
+  </p:cSld>
+  <p:clrMapOvr>
+    <a:masterClrMapping/>
+  </p:clrMapOvr>
+</p:sld>
+</file>
+
 <file path=ppt/theme/theme1.xml><?xml version="1.0" encoding="utf-8"?>
 <a:theme xmlns:a="http://schemas.openxmlformats.org/drawingml/2006/main" name="Office Theme">
   <a:themeElements>

</xml_diff>